<commit_message>
Fixing some DOM manipulations on Truco buttons and last changes in the presentation
</commit_message>
<xml_diff>
--- a/Presentation.pptx
+++ b/Presentation.pptx
@@ -9,8 +9,10 @@
     <p:sldId id="259" r:id="rId3"/>
     <p:sldId id="257" r:id="rId4"/>
     <p:sldId id="258" r:id="rId5"/>
-    <p:sldId id="260" r:id="rId6"/>
-    <p:sldId id="261" r:id="rId7"/>
+    <p:sldId id="263" r:id="rId6"/>
+    <p:sldId id="260" r:id="rId7"/>
+    <p:sldId id="262" r:id="rId8"/>
+    <p:sldId id="261" r:id="rId9"/>
   </p:sldIdLst>
   <p:sldSz cx="12192000" cy="6858000"/>
   <p:notesSz cx="6858000" cy="9144000"/>
@@ -109,6 +111,27 @@
       </a:defRPr>
     </a:lvl9pPr>
   </p:defaultTextStyle>
+  <p:extLst>
+    <p:ext uri="{521415D9-36F7-43E2-AB2F-B90AF26B5E84}">
+      <p14:sectionLst xmlns:p14="http://schemas.microsoft.com/office/powerpoint/2010/main">
+        <p14:section name="Seção Padrão" id="{6C0A6B49-75C4-42DC-B35C-35959370C2BA}">
+          <p14:sldIdLst>
+            <p14:sldId id="256"/>
+            <p14:sldId id="259"/>
+            <p14:sldId id="257"/>
+            <p14:sldId id="258"/>
+            <p14:sldId id="263"/>
+            <p14:sldId id="260"/>
+            <p14:sldId id="262"/>
+            <p14:sldId id="261"/>
+          </p14:sldIdLst>
+        </p14:section>
+      </p14:sectionLst>
+    </p:ext>
+    <p:ext uri="{EFAFB233-063F-42B5-8137-9DF3F51BA10A}">
+      <p15:sldGuideLst xmlns:p15="http://schemas.microsoft.com/office/powerpoint/2012/main"/>
+    </p:ext>
+  </p:extLst>
 </p:presentation>
 </file>
 
@@ -2747,10 +2770,7 @@
     <p:bg>
       <p:bgPr>
         <a:solidFill>
-          <a:schemeClr val="accent6">
-            <a:lumMod val="40000"/>
-            <a:lumOff val="60000"/>
-          </a:schemeClr>
+          <a:schemeClr val="bg1"/>
         </a:solidFill>
         <a:effectLst/>
       </p:bgPr>
@@ -3318,6 +3338,35 @@
 <file path=ppt/slides/slide1.xml><?xml version="1.0" encoding="utf-8"?>
 <p:sld xmlns:a="http://schemas.openxmlformats.org/drawingml/2006/main" xmlns:r="http://schemas.openxmlformats.org/officeDocument/2006/relationships" xmlns:p="http://schemas.openxmlformats.org/presentationml/2006/main">
   <p:cSld>
+    <p:bg>
+      <p:bgPr>
+        <a:gradFill>
+          <a:gsLst>
+            <a:gs pos="0">
+              <a:schemeClr val="accent6">
+                <a:lumMod val="0"/>
+                <a:lumOff val="100000"/>
+              </a:schemeClr>
+            </a:gs>
+            <a:gs pos="84000">
+              <a:schemeClr val="accent6">
+                <a:lumMod val="0"/>
+                <a:lumOff val="100000"/>
+              </a:schemeClr>
+            </a:gs>
+            <a:gs pos="100000">
+              <a:schemeClr val="accent6">
+                <a:lumMod val="100000"/>
+              </a:schemeClr>
+            </a:gs>
+          </a:gsLst>
+          <a:path path="circle">
+            <a:fillToRect l="50000" t="-80000" r="50000" b="180000"/>
+          </a:path>
+        </a:gradFill>
+        <a:effectLst/>
+      </p:bgPr>
+    </p:bg>
     <p:spTree>
       <p:nvGrpSpPr>
         <p:cNvPr id="1" name=""/>
@@ -3332,304 +3381,6 @@
           <a:chExt cx="0" cy="0"/>
         </a:xfrm>
       </p:grpSpPr>
-      <p:sp>
-        <p:nvSpPr>
-          <p:cNvPr id="10" name="Rectangle 9">
-            <a:extLst>
-              <a:ext uri="{FF2B5EF4-FFF2-40B4-BE49-F238E27FC236}">
-                <a16:creationId xmlns:a16="http://schemas.microsoft.com/office/drawing/2014/main" id="{57845966-6EFC-468A-9CC7-BAB4B95854E7}"/>
-              </a:ext>
-              <a:ext uri="{C183D7F6-B498-43B3-948B-1728B52AA6E4}">
-                <adec:decorative xmlns:adec="http://schemas.microsoft.com/office/drawing/2017/decorative" val="1"/>
-              </a:ext>
-            </a:extLst>
-          </p:cNvPr>
-          <p:cNvSpPr>
-            <a:spLocks noGrp="1" noRot="1" noChangeAspect="1" noMove="1" noResize="1" noEditPoints="1" noAdjustHandles="1" noChangeArrowheads="1" noChangeShapeType="1" noTextEdit="1"/>
-          </p:cNvSpPr>
-          <p:nvPr>
-            <p:extLst>
-              <p:ext uri="{386F3935-93C4-4BCD-93E2-E3B085C9AB24}">
-                <p16:designElem xmlns:p16="http://schemas.microsoft.com/office/powerpoint/2015/main" val="1"/>
-              </p:ext>
-            </p:extLst>
-          </p:nvPr>
-        </p:nvSpPr>
-        <p:spPr>
-          <a:xfrm>
-            <a:off x="1354372" y="0"/>
-            <a:ext cx="9483256" cy="6858000"/>
-          </a:xfrm>
-          <a:prstGeom prst="rect">
-            <a:avLst/>
-          </a:prstGeom>
-          <a:solidFill>
-            <a:srgbClr val="236219"/>
-          </a:solidFill>
-          <a:ln>
-            <a:noFill/>
-          </a:ln>
-        </p:spPr>
-        <p:style>
-          <a:lnRef idx="2">
-            <a:schemeClr val="accent1">
-              <a:shade val="50000"/>
-            </a:schemeClr>
-          </a:lnRef>
-          <a:fillRef idx="1">
-            <a:schemeClr val="accent1"/>
-          </a:fillRef>
-          <a:effectRef idx="0">
-            <a:schemeClr val="accent1"/>
-          </a:effectRef>
-          <a:fontRef idx="minor">
-            <a:schemeClr val="lt1"/>
-          </a:fontRef>
-        </p:style>
-        <p:txBody>
-          <a:bodyPr rtlCol="0" anchor="ctr"/>
-          <a:lstStyle/>
-          <a:p>
-            <a:pPr algn="ctr"/>
-            <a:endParaRPr lang="en-US"/>
-          </a:p>
-        </p:txBody>
-      </p:sp>
-      <p:pic>
-        <p:nvPicPr>
-          <p:cNvPr id="12" name="Picture 11">
-            <a:extLst>
-              <a:ext uri="{FF2B5EF4-FFF2-40B4-BE49-F238E27FC236}">
-                <a16:creationId xmlns:a16="http://schemas.microsoft.com/office/drawing/2014/main" id="{75554383-98AF-4A47-BB65-705FAAA4BE6A}"/>
-              </a:ext>
-              <a:ext uri="{C183D7F6-B498-43B3-948B-1728B52AA6E4}">
-                <adec:decorative xmlns:adec="http://schemas.microsoft.com/office/drawing/2017/decorative" val="1"/>
-              </a:ext>
-            </a:extLst>
-          </p:cNvPr>
-          <p:cNvPicPr>
-            <a:picLocks noGrp="1" noRot="1" noChangeAspect="1" noMove="1" noResize="1" noEditPoints="1" noAdjustHandles="1" noChangeArrowheads="1" noChangeShapeType="1" noCrop="1"/>
-          </p:cNvPicPr>
-          <p:nvPr>
-            <p:extLst>
-              <p:ext uri="{386F3935-93C4-4BCD-93E2-E3B085C9AB24}">
-                <p16:designElem xmlns:p16="http://schemas.microsoft.com/office/powerpoint/2015/main" val="1"/>
-              </p:ext>
-            </p:extLst>
-          </p:nvPr>
-        </p:nvPicPr>
-        <p:blipFill>
-          <a:blip r:embed="rId2">
-            <a:extLst>
-              <a:ext uri="{28A0092B-C50C-407E-A947-70E740481C1C}">
-                <a14:useLocalDpi xmlns:a14="http://schemas.microsoft.com/office/drawing/2010/main" val="0"/>
-              </a:ext>
-            </a:extLst>
-          </a:blip>
-          <a:stretch>
-            <a:fillRect/>
-          </a:stretch>
-        </p:blipFill>
-        <p:spPr>
-          <a:xfrm>
-            <a:off x="0" y="0"/>
-            <a:ext cx="12192000" cy="6858000"/>
-          </a:xfrm>
-          <a:prstGeom prst="rect">
-            <a:avLst/>
-          </a:prstGeom>
-        </p:spPr>
-      </p:pic>
-      <p:sp>
-        <p:nvSpPr>
-          <p:cNvPr id="14" name="Freeform: Shape 13">
-            <a:extLst>
-              <a:ext uri="{FF2B5EF4-FFF2-40B4-BE49-F238E27FC236}">
-                <a16:creationId xmlns:a16="http://schemas.microsoft.com/office/drawing/2014/main" id="{ADAD1991-FFD1-4E94-ABAB-7560D33008E4}"/>
-              </a:ext>
-              <a:ext uri="{C183D7F6-B498-43B3-948B-1728B52AA6E4}">
-                <adec:decorative xmlns:adec="http://schemas.microsoft.com/office/drawing/2017/decorative" val="1"/>
-              </a:ext>
-            </a:extLst>
-          </p:cNvPr>
-          <p:cNvSpPr>
-            <a:spLocks noGrp="1" noRot="1" noChangeAspect="1" noMove="1" noResize="1" noEditPoints="1" noAdjustHandles="1" noChangeArrowheads="1" noChangeShapeType="1" noTextEdit="1"/>
-          </p:cNvSpPr>
-          <p:nvPr>
-            <p:extLst>
-              <p:ext uri="{386F3935-93C4-4BCD-93E2-E3B085C9AB24}">
-                <p16:designElem xmlns:p16="http://schemas.microsoft.com/office/powerpoint/2015/main" val="1"/>
-              </p:ext>
-            </p:extLst>
-          </p:nvPr>
-        </p:nvSpPr>
-        <p:spPr>
-          <a:xfrm>
-            <a:off x="2144484" y="0"/>
-            <a:ext cx="7837716" cy="6858000"/>
-          </a:xfrm>
-          <a:custGeom>
-            <a:avLst/>
-            <a:gdLst>
-              <a:gd name="connsiteX0" fmla="*/ 2232159 w 7837716"/>
-              <a:gd name="connsiteY0" fmla="*/ 0 h 6858000"/>
-              <a:gd name="connsiteX1" fmla="*/ 5605557 w 7837716"/>
-              <a:gd name="connsiteY1" fmla="*/ 0 h 6858000"/>
-              <a:gd name="connsiteX2" fmla="*/ 5617845 w 7837716"/>
-              <a:gd name="connsiteY2" fmla="*/ 5384 h 6858000"/>
-              <a:gd name="connsiteX3" fmla="*/ 7837716 w 7837716"/>
-              <a:gd name="connsiteY3" fmla="*/ 3429000 h 6858000"/>
-              <a:gd name="connsiteX4" fmla="*/ 5617845 w 7837716"/>
-              <a:gd name="connsiteY4" fmla="*/ 6852616 h 6858000"/>
-              <a:gd name="connsiteX5" fmla="*/ 5605557 w 7837716"/>
-              <a:gd name="connsiteY5" fmla="*/ 6858000 h 6858000"/>
-              <a:gd name="connsiteX6" fmla="*/ 2232159 w 7837716"/>
-              <a:gd name="connsiteY6" fmla="*/ 6858000 h 6858000"/>
-              <a:gd name="connsiteX7" fmla="*/ 2219871 w 7837716"/>
-              <a:gd name="connsiteY7" fmla="*/ 6852616 h 6858000"/>
-              <a:gd name="connsiteX8" fmla="*/ 0 w 7837716"/>
-              <a:gd name="connsiteY8" fmla="*/ 3429000 h 6858000"/>
-              <a:gd name="connsiteX9" fmla="*/ 2219871 w 7837716"/>
-              <a:gd name="connsiteY9" fmla="*/ 5384 h 6858000"/>
-            </a:gdLst>
-            <a:ahLst/>
-            <a:cxnLst>
-              <a:cxn ang="0">
-                <a:pos x="connsiteX0" y="connsiteY0"/>
-              </a:cxn>
-              <a:cxn ang="0">
-                <a:pos x="connsiteX1" y="connsiteY1"/>
-              </a:cxn>
-              <a:cxn ang="0">
-                <a:pos x="connsiteX2" y="connsiteY2"/>
-              </a:cxn>
-              <a:cxn ang="0">
-                <a:pos x="connsiteX3" y="connsiteY3"/>
-              </a:cxn>
-              <a:cxn ang="0">
-                <a:pos x="connsiteX4" y="connsiteY4"/>
-              </a:cxn>
-              <a:cxn ang="0">
-                <a:pos x="connsiteX5" y="connsiteY5"/>
-              </a:cxn>
-              <a:cxn ang="0">
-                <a:pos x="connsiteX6" y="connsiteY6"/>
-              </a:cxn>
-              <a:cxn ang="0">
-                <a:pos x="connsiteX7" y="connsiteY7"/>
-              </a:cxn>
-              <a:cxn ang="0">
-                <a:pos x="connsiteX8" y="connsiteY8"/>
-              </a:cxn>
-              <a:cxn ang="0">
-                <a:pos x="connsiteX9" y="connsiteY9"/>
-              </a:cxn>
-            </a:cxnLst>
-            <a:rect l="l" t="t" r="r" b="b"/>
-            <a:pathLst>
-              <a:path w="7837716" h="6858000">
-                <a:moveTo>
-                  <a:pt x="2232159" y="0"/>
-                </a:moveTo>
-                <a:lnTo>
-                  <a:pt x="5605557" y="0"/>
-                </a:lnTo>
-                <a:lnTo>
-                  <a:pt x="5617845" y="5384"/>
-                </a:lnTo>
-                <a:cubicBezTo>
-                  <a:pt x="6931322" y="618789"/>
-                  <a:pt x="7837716" y="1921305"/>
-                  <a:pt x="7837716" y="3429000"/>
-                </a:cubicBezTo>
-                <a:cubicBezTo>
-                  <a:pt x="7837716" y="4936696"/>
-                  <a:pt x="6931322" y="6239212"/>
-                  <a:pt x="5617845" y="6852616"/>
-                </a:cubicBezTo>
-                <a:lnTo>
-                  <a:pt x="5605557" y="6858000"/>
-                </a:lnTo>
-                <a:lnTo>
-                  <a:pt x="2232159" y="6858000"/>
-                </a:lnTo>
-                <a:lnTo>
-                  <a:pt x="2219871" y="6852616"/>
-                </a:lnTo>
-                <a:cubicBezTo>
-                  <a:pt x="906394" y="6239212"/>
-                  <a:pt x="0" y="4936696"/>
-                  <a:pt x="0" y="3429000"/>
-                </a:cubicBezTo>
-                <a:cubicBezTo>
-                  <a:pt x="0" y="1921305"/>
-                  <a:pt x="906394" y="618789"/>
-                  <a:pt x="2219871" y="5384"/>
-                </a:cubicBezTo>
-                <a:close/>
-              </a:path>
-            </a:pathLst>
-          </a:custGeom>
-          <a:solidFill>
-            <a:schemeClr val="bg1"/>
-          </a:solidFill>
-          <a:ln>
-            <a:gradFill>
-              <a:gsLst>
-                <a:gs pos="0">
-                  <a:schemeClr val="accent1">
-                    <a:lumMod val="40000"/>
-                    <a:lumOff val="60000"/>
-                  </a:schemeClr>
-                </a:gs>
-                <a:gs pos="23000">
-                  <a:schemeClr val="accent1">
-                    <a:lumMod val="45000"/>
-                    <a:lumOff val="55000"/>
-                  </a:schemeClr>
-                </a:gs>
-                <a:gs pos="83000">
-                  <a:schemeClr val="bg2">
-                    <a:lumMod val="82000"/>
-                  </a:schemeClr>
-                </a:gs>
-                <a:gs pos="100000">
-                  <a:schemeClr val="bg2">
-                    <a:lumMod val="87000"/>
-                  </a:schemeClr>
-                </a:gs>
-              </a:gsLst>
-              <a:lin ang="5400000" scaled="1"/>
-            </a:gradFill>
-          </a:ln>
-        </p:spPr>
-        <p:style>
-          <a:lnRef idx="2">
-            <a:schemeClr val="accent1">
-              <a:shade val="50000"/>
-            </a:schemeClr>
-          </a:lnRef>
-          <a:fillRef idx="1">
-            <a:schemeClr val="accent1"/>
-          </a:fillRef>
-          <a:effectRef idx="0">
-            <a:schemeClr val="accent1"/>
-          </a:effectRef>
-          <a:fontRef idx="minor">
-            <a:schemeClr val="lt1"/>
-          </a:fontRef>
-        </p:style>
-        <p:txBody>
-          <a:bodyPr wrap="square" rtlCol="0" anchor="ctr">
-            <a:noAutofit/>
-          </a:bodyPr>
-          <a:lstStyle/>
-          <a:p>
-            <a:pPr algn="ctr"/>
-            <a:endParaRPr lang="en-US"/>
-          </a:p>
-        </p:txBody>
-      </p:sp>
       <p:pic>
         <p:nvPicPr>
           <p:cNvPr id="5" name="Imagem 4">
@@ -3645,8 +3396,17 @@
           <p:nvPr/>
         </p:nvPicPr>
         <p:blipFill>
-          <a:blip r:embed="rId3">
-            <a:extLst>
+          <a:blip r:embed="rId2">
+            <a:extLst>
+              <a:ext uri="{BEBA8EAE-BF5A-486C-A8C5-ECC9F3942E4B}">
+                <a14:imgProps xmlns:a14="http://schemas.microsoft.com/office/drawing/2010/main">
+                  <a14:imgLayer r:embed="rId3">
+                    <a14:imgEffect>
+                      <a14:artisticCrisscrossEtching/>
+                    </a14:imgEffect>
+                  </a14:imgLayer>
+                </a14:imgProps>
+              </a:ext>
               <a:ext uri="{28A0092B-C50C-407E-A947-70E740481C1C}">
                 <a14:useLocalDpi xmlns:a14="http://schemas.microsoft.com/office/drawing/2010/main" val="0"/>
               </a:ext>
@@ -3664,6 +3424,21 @@
           <a:prstGeom prst="rect">
             <a:avLst/>
           </a:prstGeom>
+          <a:effectLst>
+            <a:glow rad="228600">
+              <a:schemeClr val="accent6">
+                <a:satMod val="175000"/>
+                <a:alpha val="40000"/>
+              </a:schemeClr>
+            </a:glow>
+            <a:outerShdw blurRad="838200" dist="50800" dir="5400000" algn="ctr" rotWithShape="0">
+              <a:schemeClr val="accent6">
+                <a:lumMod val="20000"/>
+                <a:lumOff val="80000"/>
+                <a:alpha val="0"/>
+              </a:schemeClr>
+            </a:outerShdw>
+          </a:effectLst>
         </p:spPr>
       </p:pic>
       <p:sp>
@@ -3680,7 +3455,7 @@
         </p:nvSpPr>
         <p:spPr>
           <a:xfrm>
-            <a:off x="2317722" y="5277069"/>
+            <a:off x="2291754" y="5277069"/>
             <a:ext cx="7608491" cy="1200329"/>
           </a:xfrm>
           <a:prstGeom prst="rect">
@@ -3697,36 +3472,61 @@
             <a:pPr algn="ctr"/>
             <a:r>
               <a:rPr lang="pt-BR" sz="3600" dirty="0" err="1">
+                <a:solidFill>
+                  <a:schemeClr val="bg2">
+                    <a:lumMod val="25000"/>
+                  </a:schemeClr>
+                </a:solidFill>
                 <a:latin typeface="Bernard MT Condensed" panose="02050806060905020404" pitchFamily="18" charset="0"/>
               </a:rPr>
               <a:t>Ironhack</a:t>
             </a:r>
             <a:r>
               <a:rPr lang="pt-BR" sz="3600" dirty="0">
+                <a:solidFill>
+                  <a:schemeClr val="bg2">
+                    <a:lumMod val="25000"/>
+                  </a:schemeClr>
+                </a:solidFill>
                 <a:latin typeface="Bernard MT Condensed" panose="02050806060905020404" pitchFamily="18" charset="0"/>
               </a:rPr>
               <a:t> </a:t>
             </a:r>
             <a:r>
               <a:rPr lang="pt-BR" sz="3600" dirty="0" err="1">
+                <a:solidFill>
+                  <a:schemeClr val="bg2">
+                    <a:lumMod val="25000"/>
+                  </a:schemeClr>
+                </a:solidFill>
                 <a:latin typeface="Bernard MT Condensed" panose="02050806060905020404" pitchFamily="18" charset="0"/>
               </a:rPr>
               <a:t>WebDev</a:t>
             </a:r>
             <a:r>
               <a:rPr lang="pt-BR" sz="3600" dirty="0">
+                <a:solidFill>
+                  <a:schemeClr val="bg2">
+                    <a:lumMod val="25000"/>
+                  </a:schemeClr>
+                </a:solidFill>
                 <a:latin typeface="Bernard MT Condensed" panose="02050806060905020404" pitchFamily="18" charset="0"/>
               </a:rPr>
-              <a:t> – Projeto Módulo </a:t>
+              <a:t> PT6 São Paulo </a:t>
             </a:r>
           </a:p>
           <a:p>
             <a:pPr algn="ctr"/>
             <a:r>
               <a:rPr lang="pt-BR" sz="3600" dirty="0">
+                <a:solidFill>
+                  <a:schemeClr val="bg2">
+                    <a:lumMod val="25000"/>
+                  </a:schemeClr>
+                </a:solidFill>
                 <a:latin typeface="Bernard MT Condensed" panose="02050806060905020404" pitchFamily="18" charset="0"/>
               </a:rPr>
-              <a:t>Paulo Salles</a:t>
+              <a:t>Projeto Módulo 1 - Paulo Salles</a:t>
             </a:r>
           </a:p>
         </p:txBody>
@@ -3783,8 +3583,24 @@
           <a:lstStyle/>
           <a:p>
             <a:r>
-              <a:rPr lang="pt-BR" dirty="0"/>
-              <a:t>Olá!!!</a:t>
+              <a:rPr lang="pt-BR" sz="4800" b="1" dirty="0" err="1">
+                <a:solidFill>
+                  <a:schemeClr val="bg2">
+                    <a:lumMod val="25000"/>
+                  </a:schemeClr>
+                </a:solidFill>
+              </a:rPr>
+              <a:t>Hello</a:t>
+            </a:r>
+            <a:r>
+              <a:rPr lang="pt-BR" dirty="0">
+                <a:solidFill>
+                  <a:schemeClr val="bg2">
+                    <a:lumMod val="25000"/>
+                  </a:schemeClr>
+                </a:solidFill>
+              </a:rPr>
+              <a:t>!!!</a:t>
             </a:r>
           </a:p>
         </p:txBody>
@@ -3805,24 +3621,357 @@
             <p:ph idx="1"/>
           </p:nvPr>
         </p:nvSpPr>
-        <p:spPr/>
+        <p:spPr>
+          <a:ln>
+            <a:gradFill flip="none" rotWithShape="1">
+              <a:gsLst>
+                <a:gs pos="0">
+                  <a:schemeClr val="accent6">
+                    <a:lumMod val="0"/>
+                    <a:lumOff val="100000"/>
+                  </a:schemeClr>
+                </a:gs>
+                <a:gs pos="35000">
+                  <a:schemeClr val="accent6">
+                    <a:lumMod val="0"/>
+                    <a:lumOff val="100000"/>
+                  </a:schemeClr>
+                </a:gs>
+                <a:gs pos="100000">
+                  <a:schemeClr val="accent6">
+                    <a:lumMod val="100000"/>
+                  </a:schemeClr>
+                </a:gs>
+              </a:gsLst>
+              <a:path path="circle">
+                <a:fillToRect l="50000" t="-80000" r="50000" b="180000"/>
+              </a:path>
+              <a:tileRect/>
+            </a:gradFill>
+          </a:ln>
+        </p:spPr>
         <p:txBody>
           <a:bodyPr/>
           <a:lstStyle/>
           <a:p>
             <a:r>
-              <a:rPr lang="pt-BR" dirty="0"/>
-              <a:t>Meu nome é Paulo, nascido e cidadão de São Paulo.</a:t>
-            </a:r>
-          </a:p>
-          <a:p>
-            <a:r>
-              <a:rPr lang="pt-BR" dirty="0"/>
-              <a:t>Sou tricolor de coração</a:t>
-            </a:r>
-          </a:p>
-        </p:txBody>
-      </p:sp>
+              <a:rPr lang="pt-BR" dirty="0" err="1">
+                <a:solidFill>
+                  <a:schemeClr val="bg2">
+                    <a:lumMod val="25000"/>
+                  </a:schemeClr>
+                </a:solidFill>
+              </a:rPr>
+              <a:t>I’m</a:t>
+            </a:r>
+            <a:r>
+              <a:rPr lang="pt-BR" dirty="0">
+                <a:solidFill>
+                  <a:schemeClr val="bg2">
+                    <a:lumMod val="25000"/>
+                  </a:schemeClr>
+                </a:solidFill>
+              </a:rPr>
+              <a:t> Paulo Salles, </a:t>
+            </a:r>
+            <a:r>
+              <a:rPr lang="pt-BR" dirty="0" err="1">
+                <a:solidFill>
+                  <a:schemeClr val="bg2">
+                    <a:lumMod val="25000"/>
+                  </a:schemeClr>
+                </a:solidFill>
+              </a:rPr>
+              <a:t>lives</a:t>
+            </a:r>
+            <a:r>
+              <a:rPr lang="pt-BR" dirty="0">
+                <a:solidFill>
+                  <a:schemeClr val="bg2">
+                    <a:lumMod val="25000"/>
+                  </a:schemeClr>
+                </a:solidFill>
+              </a:rPr>
+              <a:t> in São Paulo </a:t>
+            </a:r>
+            <a:r>
+              <a:rPr lang="pt-BR" dirty="0" err="1">
+                <a:solidFill>
+                  <a:schemeClr val="bg2">
+                    <a:lumMod val="25000"/>
+                  </a:schemeClr>
+                </a:solidFill>
+              </a:rPr>
+              <a:t>and</a:t>
+            </a:r>
+            <a:r>
+              <a:rPr lang="pt-BR" dirty="0">
+                <a:solidFill>
+                  <a:schemeClr val="bg2">
+                    <a:lumMod val="25000"/>
+                  </a:schemeClr>
+                </a:solidFill>
+              </a:rPr>
+              <a:t> </a:t>
+            </a:r>
+            <a:r>
+              <a:rPr lang="pt-BR" dirty="0" err="1">
+                <a:solidFill>
+                  <a:schemeClr val="bg2">
+                    <a:lumMod val="25000"/>
+                  </a:schemeClr>
+                </a:solidFill>
+              </a:rPr>
+              <a:t>I’m</a:t>
+            </a:r>
+            <a:r>
+              <a:rPr lang="pt-BR" dirty="0">
+                <a:solidFill>
+                  <a:schemeClr val="bg2">
+                    <a:lumMod val="25000"/>
+                  </a:schemeClr>
+                </a:solidFill>
+              </a:rPr>
+              <a:t> </a:t>
+            </a:r>
+            <a:r>
+              <a:rPr lang="pt-BR" dirty="0" err="1">
+                <a:solidFill>
+                  <a:schemeClr val="bg2">
+                    <a:lumMod val="25000"/>
+                  </a:schemeClr>
+                </a:solidFill>
+              </a:rPr>
+              <a:t>passionate</a:t>
+            </a:r>
+            <a:r>
+              <a:rPr lang="pt-BR" dirty="0">
+                <a:solidFill>
+                  <a:schemeClr val="bg2">
+                    <a:lumMod val="25000"/>
+                  </a:schemeClr>
+                </a:solidFill>
+              </a:rPr>
+              <a:t> by Technology</a:t>
+            </a:r>
+          </a:p>
+          <a:p>
+            <a:r>
+              <a:rPr lang="pt-BR" dirty="0">
+                <a:solidFill>
+                  <a:schemeClr val="bg2">
+                    <a:lumMod val="25000"/>
+                  </a:schemeClr>
+                </a:solidFill>
+              </a:rPr>
+              <a:t>Bacharel in Computer Engineering</a:t>
+            </a:r>
+          </a:p>
+          <a:p>
+            <a:r>
+              <a:rPr lang="pt-BR" dirty="0">
+                <a:solidFill>
+                  <a:schemeClr val="bg2">
+                    <a:lumMod val="25000"/>
+                  </a:schemeClr>
+                </a:solidFill>
+              </a:rPr>
+              <a:t>Experience </a:t>
+            </a:r>
+            <a:r>
+              <a:rPr lang="pt-BR" dirty="0" err="1">
+                <a:solidFill>
+                  <a:schemeClr val="bg2">
+                    <a:lumMod val="25000"/>
+                  </a:schemeClr>
+                </a:solidFill>
+              </a:rPr>
+              <a:t>Infrasctructure</a:t>
+            </a:r>
+            <a:r>
+              <a:rPr lang="pt-BR" dirty="0">
+                <a:solidFill>
+                  <a:schemeClr val="bg2">
+                    <a:lumMod val="25000"/>
+                  </a:schemeClr>
+                </a:solidFill>
+              </a:rPr>
+              <a:t> </a:t>
+            </a:r>
+            <a:r>
+              <a:rPr lang="pt-BR" dirty="0" err="1">
+                <a:solidFill>
+                  <a:schemeClr val="bg2">
+                    <a:lumMod val="25000"/>
+                  </a:schemeClr>
+                </a:solidFill>
+              </a:rPr>
+              <a:t>and</a:t>
+            </a:r>
+            <a:r>
+              <a:rPr lang="pt-BR" dirty="0">
+                <a:solidFill>
+                  <a:schemeClr val="bg2">
+                    <a:lumMod val="25000"/>
+                  </a:schemeClr>
+                </a:solidFill>
+              </a:rPr>
+              <a:t> UC </a:t>
+            </a:r>
+            <a:r>
+              <a:rPr lang="pt-BR" dirty="0" err="1">
+                <a:solidFill>
+                  <a:schemeClr val="bg2">
+                    <a:lumMod val="25000"/>
+                  </a:schemeClr>
+                </a:solidFill>
+              </a:rPr>
+              <a:t>Solutions</a:t>
+            </a:r>
+            <a:endParaRPr lang="pt-BR" dirty="0">
+              <a:solidFill>
+                <a:schemeClr val="bg2">
+                  <a:lumMod val="25000"/>
+                </a:schemeClr>
+              </a:solidFill>
+            </a:endParaRPr>
+          </a:p>
+          <a:p>
+            <a:r>
+              <a:rPr lang="pt-BR" dirty="0">
+                <a:solidFill>
+                  <a:schemeClr val="bg2">
+                    <a:lumMod val="25000"/>
+                  </a:schemeClr>
+                </a:solidFill>
+              </a:rPr>
+              <a:t>Tricolor by </a:t>
+            </a:r>
+            <a:r>
+              <a:rPr lang="pt-BR" dirty="0" err="1">
+                <a:solidFill>
+                  <a:schemeClr val="bg2">
+                    <a:lumMod val="25000"/>
+                  </a:schemeClr>
+                </a:solidFill>
+              </a:rPr>
+              <a:t>heart</a:t>
+            </a:r>
+            <a:endParaRPr lang="pt-BR" dirty="0">
+              <a:solidFill>
+                <a:schemeClr val="bg2">
+                  <a:lumMod val="25000"/>
+                </a:schemeClr>
+              </a:solidFill>
+            </a:endParaRPr>
+          </a:p>
+          <a:p>
+            <a:endParaRPr lang="pt-BR" dirty="0">
+              <a:solidFill>
+                <a:schemeClr val="bg2">
+                  <a:lumMod val="25000"/>
+                </a:schemeClr>
+              </a:solidFill>
+            </a:endParaRPr>
+          </a:p>
+          <a:p>
+            <a:endParaRPr lang="pt-BR" dirty="0">
+              <a:solidFill>
+                <a:schemeClr val="bg2">
+                  <a:lumMod val="25000"/>
+                </a:schemeClr>
+              </a:solidFill>
+            </a:endParaRPr>
+          </a:p>
+          <a:p>
+            <a:endParaRPr lang="pt-BR" dirty="0"/>
+          </a:p>
+        </p:txBody>
+      </p:sp>
+      <p:pic>
+        <p:nvPicPr>
+          <p:cNvPr id="4" name="Imagem 3">
+            <a:extLst>
+              <a:ext uri="{FF2B5EF4-FFF2-40B4-BE49-F238E27FC236}">
+                <a16:creationId xmlns:a16="http://schemas.microsoft.com/office/drawing/2014/main" id="{F418B453-83CA-4272-9B2D-285FC847DDF7}"/>
+              </a:ext>
+            </a:extLst>
+          </p:cNvPr>
+          <p:cNvPicPr>
+            <a:picLocks noChangeAspect="1"/>
+          </p:cNvPicPr>
+          <p:nvPr/>
+        </p:nvPicPr>
+        <p:blipFill>
+          <a:blip r:embed="rId2">
+            <a:extLst>
+              <a:ext uri="{BEBA8EAE-BF5A-486C-A8C5-ECC9F3942E4B}">
+                <a14:imgProps xmlns:a14="http://schemas.microsoft.com/office/drawing/2010/main">
+                  <a14:imgLayer r:embed="rId3">
+                    <a14:imgEffect>
+                      <a14:artisticCrisscrossEtching/>
+                    </a14:imgEffect>
+                  </a14:imgLayer>
+                </a14:imgProps>
+              </a:ext>
+              <a:ext uri="{28A0092B-C50C-407E-A947-70E740481C1C}">
+                <a14:useLocalDpi xmlns:a14="http://schemas.microsoft.com/office/drawing/2010/main" val="0"/>
+              </a:ext>
+            </a:extLst>
+          </a:blip>
+          <a:stretch>
+            <a:fillRect/>
+          </a:stretch>
+        </p:blipFill>
+        <p:spPr>
+          <a:xfrm>
+            <a:off x="10575065" y="142612"/>
+            <a:ext cx="1401355" cy="1401355"/>
+          </a:xfrm>
+          <a:prstGeom prst="rect">
+            <a:avLst/>
+          </a:prstGeom>
+          <a:effectLst>
+            <a:outerShdw blurRad="838200" dist="50800" dir="5400000" algn="ctr" rotWithShape="0">
+              <a:schemeClr val="accent6">
+                <a:lumMod val="20000"/>
+                <a:lumOff val="80000"/>
+                <a:alpha val="0"/>
+              </a:schemeClr>
+            </a:outerShdw>
+          </a:effectLst>
+        </p:spPr>
+      </p:pic>
+      <p:pic>
+        <p:nvPicPr>
+          <p:cNvPr id="5" name="Imagem 4">
+            <a:extLst>
+              <a:ext uri="{FF2B5EF4-FFF2-40B4-BE49-F238E27FC236}">
+                <a16:creationId xmlns:a16="http://schemas.microsoft.com/office/drawing/2014/main" id="{121A5FE6-0AF9-43CD-85CD-4E5EF5169D20}"/>
+              </a:ext>
+            </a:extLst>
+          </p:cNvPr>
+          <p:cNvPicPr>
+            <a:picLocks noChangeAspect="1"/>
+          </p:cNvPicPr>
+          <p:nvPr/>
+        </p:nvPicPr>
+        <p:blipFill>
+          <a:blip r:embed="rId4"/>
+          <a:stretch>
+            <a:fillRect/>
+          </a:stretch>
+        </p:blipFill>
+        <p:spPr>
+          <a:xfrm>
+            <a:off x="3627875" y="3308756"/>
+            <a:ext cx="541453" cy="541453"/>
+          </a:xfrm>
+          <a:prstGeom prst="rect">
+            <a:avLst/>
+          </a:prstGeom>
+        </p:spPr>
+      </p:pic>
     </p:spTree>
     <p:extLst>
       <p:ext uri="{BB962C8B-B14F-4D97-AF65-F5344CB8AC3E}">
@@ -3875,14 +4024,15 @@
           <a:lstStyle/>
           <a:p>
             <a:r>
-              <a:rPr lang="pt-BR" dirty="0"/>
-              <a:t>Project </a:t>
-            </a:r>
-            <a:r>
-              <a:rPr lang="pt-BR" dirty="0" err="1"/>
-              <a:t>goals</a:t>
-            </a:r>
-            <a:endParaRPr lang="pt-BR" dirty="0"/>
+              <a:rPr lang="pt-BR" dirty="0">
+                <a:solidFill>
+                  <a:schemeClr val="bg2">
+                    <a:lumMod val="25000"/>
+                  </a:schemeClr>
+                </a:solidFill>
+              </a:rPr>
+              <a:t>Project goals</a:t>
+            </a:r>
           </a:p>
         </p:txBody>
       </p:sp>
@@ -3902,125 +4052,345 @@
             <p:ph idx="1"/>
           </p:nvPr>
         </p:nvSpPr>
-        <p:spPr/>
+        <p:spPr>
+          <a:noFill/>
+          <a:ln w="12700" cap="rnd">
+            <a:gradFill flip="none" rotWithShape="1">
+              <a:gsLst>
+                <a:gs pos="0">
+                  <a:schemeClr val="accent6">
+                    <a:lumMod val="0"/>
+                    <a:lumOff val="100000"/>
+                  </a:schemeClr>
+                </a:gs>
+                <a:gs pos="35000">
+                  <a:schemeClr val="accent6">
+                    <a:lumMod val="0"/>
+                    <a:lumOff val="100000"/>
+                  </a:schemeClr>
+                </a:gs>
+                <a:gs pos="100000">
+                  <a:schemeClr val="accent6">
+                    <a:lumMod val="100000"/>
+                  </a:schemeClr>
+                </a:gs>
+              </a:gsLst>
+              <a:path path="circle">
+                <a:fillToRect l="50000" t="-80000" r="50000" b="180000"/>
+              </a:path>
+              <a:tileRect/>
+            </a:gradFill>
+            <a:bevel/>
+          </a:ln>
+        </p:spPr>
         <p:txBody>
           <a:bodyPr/>
           <a:lstStyle/>
           <a:p>
             <a:r>
-              <a:rPr lang="pt-BR" dirty="0" err="1"/>
+              <a:rPr lang="pt-BR" dirty="0" err="1">
+                <a:solidFill>
+                  <a:schemeClr val="bg2">
+                    <a:lumMod val="25000"/>
+                  </a:schemeClr>
+                </a:solidFill>
+              </a:rPr>
               <a:t>Create</a:t>
             </a:r>
             <a:r>
-              <a:rPr lang="pt-BR" dirty="0"/>
+              <a:rPr lang="pt-BR" dirty="0">
+                <a:solidFill>
+                  <a:schemeClr val="bg2">
+                    <a:lumMod val="25000"/>
+                  </a:schemeClr>
+                </a:solidFill>
+              </a:rPr>
               <a:t> a truco game with all </a:t>
             </a:r>
             <a:r>
-              <a:rPr lang="pt-BR" dirty="0" err="1"/>
+              <a:rPr lang="pt-BR" dirty="0" err="1">
+                <a:solidFill>
+                  <a:schemeClr val="bg2">
+                    <a:lumMod val="25000"/>
+                  </a:schemeClr>
+                </a:solidFill>
+              </a:rPr>
               <a:t>rules</a:t>
             </a:r>
+            <a:endParaRPr lang="pt-BR" dirty="0">
+              <a:solidFill>
+                <a:schemeClr val="bg2">
+                  <a:lumMod val="25000"/>
+                </a:schemeClr>
+              </a:solidFill>
+            </a:endParaRPr>
+          </a:p>
+          <a:p>
+            <a:r>
+              <a:rPr lang="pt-BR" dirty="0">
+                <a:solidFill>
+                  <a:schemeClr val="bg2">
+                    <a:lumMod val="25000"/>
+                  </a:schemeClr>
+                </a:solidFill>
+              </a:rPr>
+              <a:t>Use all </a:t>
+            </a:r>
+            <a:r>
+              <a:rPr lang="pt-BR" dirty="0" err="1">
+                <a:solidFill>
+                  <a:schemeClr val="bg2">
+                    <a:lumMod val="25000"/>
+                  </a:schemeClr>
+                </a:solidFill>
+              </a:rPr>
+              <a:t>the</a:t>
+            </a:r>
+            <a:r>
+              <a:rPr lang="pt-BR" dirty="0">
+                <a:solidFill>
+                  <a:schemeClr val="bg2">
+                    <a:lumMod val="25000"/>
+                  </a:schemeClr>
+                </a:solidFill>
+              </a:rPr>
+              <a:t> </a:t>
+            </a:r>
+            <a:r>
+              <a:rPr lang="pt-BR" dirty="0" err="1">
+                <a:solidFill>
+                  <a:schemeClr val="bg2">
+                    <a:lumMod val="25000"/>
+                  </a:schemeClr>
+                </a:solidFill>
+              </a:rPr>
+              <a:t>knowledge</a:t>
+            </a:r>
+            <a:r>
+              <a:rPr lang="pt-BR" dirty="0">
+                <a:solidFill>
+                  <a:schemeClr val="bg2">
+                    <a:lumMod val="25000"/>
+                  </a:schemeClr>
+                </a:solidFill>
+              </a:rPr>
+              <a:t> </a:t>
+            </a:r>
+            <a:r>
+              <a:rPr lang="pt-BR" dirty="0" err="1">
+                <a:solidFill>
+                  <a:schemeClr val="bg2">
+                    <a:lumMod val="25000"/>
+                  </a:schemeClr>
+                </a:solidFill>
+              </a:rPr>
+              <a:t>learned</a:t>
+            </a:r>
+            <a:r>
+              <a:rPr lang="pt-BR" dirty="0">
+                <a:solidFill>
+                  <a:schemeClr val="bg2">
+                    <a:lumMod val="25000"/>
+                  </a:schemeClr>
+                </a:solidFill>
+              </a:rPr>
+              <a:t> </a:t>
+            </a:r>
+            <a:r>
+              <a:rPr lang="pt-BR" dirty="0" err="1">
+                <a:solidFill>
+                  <a:schemeClr val="bg2">
+                    <a:lumMod val="25000"/>
+                  </a:schemeClr>
+                </a:solidFill>
+              </a:rPr>
+              <a:t>at</a:t>
+            </a:r>
+            <a:r>
+              <a:rPr lang="pt-BR" dirty="0">
+                <a:solidFill>
+                  <a:schemeClr val="bg2">
+                    <a:lumMod val="25000"/>
+                  </a:schemeClr>
+                </a:solidFill>
+              </a:rPr>
+              <a:t> modulo 1</a:t>
+            </a:r>
+          </a:p>
+          <a:p>
+            <a:r>
+              <a:rPr lang="pt-BR" dirty="0">
+                <a:solidFill>
+                  <a:schemeClr val="bg2">
+                    <a:lumMod val="25000"/>
+                  </a:schemeClr>
+                </a:solidFill>
+              </a:rPr>
+              <a:t>Use DOM </a:t>
+            </a:r>
+            <a:r>
+              <a:rPr lang="pt-BR" dirty="0" err="1">
+                <a:solidFill>
+                  <a:schemeClr val="bg2">
+                    <a:lumMod val="25000"/>
+                  </a:schemeClr>
+                </a:solidFill>
+              </a:rPr>
+              <a:t>to</a:t>
+            </a:r>
+            <a:r>
+              <a:rPr lang="pt-BR" dirty="0">
+                <a:solidFill>
+                  <a:schemeClr val="bg2">
+                    <a:lumMod val="25000"/>
+                  </a:schemeClr>
+                </a:solidFill>
+              </a:rPr>
+              <a:t> give a </a:t>
+            </a:r>
+            <a:r>
+              <a:rPr lang="pt-BR" dirty="0" err="1">
+                <a:solidFill>
+                  <a:schemeClr val="bg2">
+                    <a:lumMod val="25000"/>
+                  </a:schemeClr>
+                </a:solidFill>
+              </a:rPr>
+              <a:t>better</a:t>
+            </a:r>
+            <a:r>
+              <a:rPr lang="pt-BR" dirty="0">
+                <a:solidFill>
+                  <a:schemeClr val="bg2">
+                    <a:lumMod val="25000"/>
+                  </a:schemeClr>
+                </a:solidFill>
+              </a:rPr>
+              <a:t> </a:t>
+            </a:r>
+            <a:r>
+              <a:rPr lang="pt-BR" dirty="0" err="1">
+                <a:solidFill>
+                  <a:schemeClr val="bg2">
+                    <a:lumMod val="25000"/>
+                  </a:schemeClr>
+                </a:solidFill>
+              </a:rPr>
+              <a:t>experience</a:t>
+            </a:r>
+            <a:r>
+              <a:rPr lang="pt-BR" dirty="0">
+                <a:solidFill>
+                  <a:schemeClr val="bg2">
+                    <a:lumMod val="25000"/>
+                  </a:schemeClr>
+                </a:solidFill>
+              </a:rPr>
+              <a:t> </a:t>
+            </a:r>
+            <a:r>
+              <a:rPr lang="pt-BR" dirty="0" err="1">
+                <a:solidFill>
+                  <a:schemeClr val="bg2">
+                    <a:lumMod val="25000"/>
+                  </a:schemeClr>
+                </a:solidFill>
+              </a:rPr>
+              <a:t>to</a:t>
+            </a:r>
+            <a:r>
+              <a:rPr lang="pt-BR" dirty="0">
+                <a:solidFill>
+                  <a:schemeClr val="bg2">
+                    <a:lumMod val="25000"/>
+                  </a:schemeClr>
+                </a:solidFill>
+              </a:rPr>
+              <a:t> </a:t>
+            </a:r>
+            <a:r>
+              <a:rPr lang="pt-BR" dirty="0" err="1">
+                <a:solidFill>
+                  <a:schemeClr val="bg2">
+                    <a:lumMod val="25000"/>
+                  </a:schemeClr>
+                </a:solidFill>
+              </a:rPr>
+              <a:t>the</a:t>
+            </a:r>
+            <a:r>
+              <a:rPr lang="pt-BR" dirty="0">
+                <a:solidFill>
+                  <a:schemeClr val="bg2">
+                    <a:lumMod val="25000"/>
+                  </a:schemeClr>
+                </a:solidFill>
+              </a:rPr>
+              <a:t> players</a:t>
+            </a:r>
+          </a:p>
+          <a:p>
             <a:endParaRPr lang="pt-BR" dirty="0"/>
           </a:p>
           <a:p>
-            <a:r>
-              <a:rPr lang="pt-BR" dirty="0"/>
-              <a:t>Use all </a:t>
-            </a:r>
-            <a:r>
-              <a:rPr lang="pt-BR" dirty="0" err="1"/>
-              <a:t>the</a:t>
-            </a:r>
-            <a:r>
-              <a:rPr lang="pt-BR" dirty="0"/>
-              <a:t> </a:t>
-            </a:r>
-            <a:r>
-              <a:rPr lang="pt-BR" dirty="0" err="1"/>
-              <a:t>knowledge</a:t>
-            </a:r>
-            <a:r>
-              <a:rPr lang="pt-BR" dirty="0"/>
-              <a:t> </a:t>
-            </a:r>
-            <a:r>
-              <a:rPr lang="pt-BR" dirty="0" err="1"/>
-              <a:t>learned</a:t>
-            </a:r>
-            <a:r>
-              <a:rPr lang="pt-BR" dirty="0"/>
-              <a:t> </a:t>
-            </a:r>
-            <a:r>
-              <a:rPr lang="pt-BR" dirty="0" err="1"/>
-              <a:t>at</a:t>
-            </a:r>
-            <a:r>
-              <a:rPr lang="pt-BR" dirty="0"/>
-              <a:t> modulo 1</a:t>
-            </a:r>
-          </a:p>
-          <a:p>
-            <a:r>
-              <a:rPr lang="pt-BR" dirty="0"/>
-              <a:t>Use DOM </a:t>
-            </a:r>
-            <a:r>
-              <a:rPr lang="pt-BR" dirty="0" err="1"/>
-              <a:t>to</a:t>
-            </a:r>
-            <a:r>
-              <a:rPr lang="pt-BR" dirty="0"/>
-              <a:t> give a </a:t>
-            </a:r>
-            <a:r>
-              <a:rPr lang="pt-BR" dirty="0" err="1"/>
-              <a:t>better</a:t>
-            </a:r>
-            <a:r>
-              <a:rPr lang="pt-BR" dirty="0"/>
-              <a:t> performance </a:t>
-            </a:r>
-            <a:r>
-              <a:rPr lang="pt-BR" dirty="0" err="1"/>
-              <a:t>and</a:t>
-            </a:r>
-            <a:r>
-              <a:rPr lang="pt-BR" dirty="0"/>
-              <a:t> </a:t>
-            </a:r>
-            <a:r>
-              <a:rPr lang="pt-BR" dirty="0" err="1"/>
-              <a:t>experience</a:t>
-            </a:r>
-            <a:r>
-              <a:rPr lang="pt-BR" dirty="0"/>
-              <a:t> </a:t>
-            </a:r>
-            <a:r>
-              <a:rPr lang="pt-BR" dirty="0" err="1"/>
-              <a:t>to</a:t>
-            </a:r>
-            <a:r>
-              <a:rPr lang="pt-BR" dirty="0"/>
-              <a:t> </a:t>
-            </a:r>
-            <a:r>
-              <a:rPr lang="pt-BR" dirty="0" err="1"/>
-              <a:t>the</a:t>
-            </a:r>
-            <a:r>
-              <a:rPr lang="pt-BR" dirty="0"/>
-              <a:t> players</a:t>
-            </a:r>
-          </a:p>
-          <a:p>
             <a:endParaRPr lang="pt-BR" dirty="0"/>
           </a:p>
-          <a:p>
-            <a:endParaRPr lang="pt-BR" dirty="0"/>
-          </a:p>
-        </p:txBody>
-      </p:sp>
+        </p:txBody>
+      </p:sp>
+      <p:pic>
+        <p:nvPicPr>
+          <p:cNvPr id="4" name="Imagem 3">
+            <a:extLst>
+              <a:ext uri="{FF2B5EF4-FFF2-40B4-BE49-F238E27FC236}">
+                <a16:creationId xmlns:a16="http://schemas.microsoft.com/office/drawing/2014/main" id="{457DC330-E835-44FF-ADBD-68627FE806DA}"/>
+              </a:ext>
+            </a:extLst>
+          </p:cNvPr>
+          <p:cNvPicPr>
+            <a:picLocks noChangeAspect="1"/>
+          </p:cNvPicPr>
+          <p:nvPr/>
+        </p:nvPicPr>
+        <p:blipFill>
+          <a:blip r:embed="rId2">
+            <a:extLst>
+              <a:ext uri="{BEBA8EAE-BF5A-486C-A8C5-ECC9F3942E4B}">
+                <a14:imgProps xmlns:a14="http://schemas.microsoft.com/office/drawing/2010/main">
+                  <a14:imgLayer r:embed="rId3">
+                    <a14:imgEffect>
+                      <a14:artisticCrisscrossEtching/>
+                    </a14:imgEffect>
+                  </a14:imgLayer>
+                </a14:imgProps>
+              </a:ext>
+              <a:ext uri="{28A0092B-C50C-407E-A947-70E740481C1C}">
+                <a14:useLocalDpi xmlns:a14="http://schemas.microsoft.com/office/drawing/2010/main" val="0"/>
+              </a:ext>
+            </a:extLst>
+          </a:blip>
+          <a:stretch>
+            <a:fillRect/>
+          </a:stretch>
+        </p:blipFill>
+        <p:spPr>
+          <a:xfrm>
+            <a:off x="10575065" y="142612"/>
+            <a:ext cx="1401355" cy="1401355"/>
+          </a:xfrm>
+          <a:prstGeom prst="rect">
+            <a:avLst/>
+          </a:prstGeom>
+          <a:effectLst>
+            <a:outerShdw blurRad="838200" dist="50800" dir="5400000" algn="ctr" rotWithShape="0">
+              <a:schemeClr val="accent6">
+                <a:lumMod val="20000"/>
+                <a:lumOff val="80000"/>
+                <a:alpha val="0"/>
+              </a:schemeClr>
+            </a:outerShdw>
+          </a:effectLst>
+        </p:spPr>
+      </p:pic>
     </p:spTree>
     <p:extLst>
       <p:ext uri="{BB962C8B-B14F-4D97-AF65-F5344CB8AC3E}">
@@ -4073,10 +4443,22 @@
           <a:lstStyle/>
           <a:p>
             <a:r>
-              <a:rPr lang="pt-BR" dirty="0" err="1"/>
+              <a:rPr lang="pt-BR" dirty="0" err="1">
+                <a:solidFill>
+                  <a:schemeClr val="bg2">
+                    <a:lumMod val="25000"/>
+                  </a:schemeClr>
+                </a:solidFill>
+              </a:rPr>
               <a:t>Challengers</a:t>
             </a:r>
-            <a:endParaRPr lang="pt-BR" dirty="0"/>
+            <a:endParaRPr lang="pt-BR" dirty="0">
+              <a:solidFill>
+                <a:schemeClr val="bg2">
+                  <a:lumMod val="25000"/>
+                </a:schemeClr>
+              </a:solidFill>
+            </a:endParaRPr>
           </a:p>
         </p:txBody>
       </p:sp>
@@ -4096,157 +4478,449 @@
             <p:ph idx="1"/>
           </p:nvPr>
         </p:nvSpPr>
-        <p:spPr/>
+        <p:spPr>
+          <a:ln w="12700">
+            <a:gradFill flip="none" rotWithShape="1">
+              <a:gsLst>
+                <a:gs pos="15000">
+                  <a:schemeClr val="accent6">
+                    <a:lumMod val="0"/>
+                    <a:lumOff val="100000"/>
+                  </a:schemeClr>
+                </a:gs>
+                <a:gs pos="35000">
+                  <a:schemeClr val="accent6">
+                    <a:lumMod val="0"/>
+                    <a:lumOff val="100000"/>
+                  </a:schemeClr>
+                </a:gs>
+                <a:gs pos="100000">
+                  <a:schemeClr val="accent6">
+                    <a:lumMod val="100000"/>
+                  </a:schemeClr>
+                </a:gs>
+              </a:gsLst>
+              <a:path path="circle">
+                <a:fillToRect l="50000" t="-80000" r="50000" b="180000"/>
+              </a:path>
+              <a:tileRect/>
+            </a:gradFill>
+          </a:ln>
+        </p:spPr>
         <p:txBody>
           <a:bodyPr/>
           <a:lstStyle/>
           <a:p>
             <a:r>
-              <a:rPr lang="pt-BR" dirty="0"/>
+              <a:rPr lang="pt-BR" dirty="0">
+                <a:solidFill>
+                  <a:schemeClr val="bg2">
+                    <a:lumMod val="25000"/>
+                  </a:schemeClr>
+                </a:solidFill>
+              </a:rPr>
               <a:t>Define </a:t>
             </a:r>
             <a:r>
-              <a:rPr lang="pt-BR" dirty="0" err="1"/>
+              <a:rPr lang="pt-BR" dirty="0" err="1">
+                <a:solidFill>
+                  <a:schemeClr val="bg2">
+                    <a:lumMod val="25000"/>
+                  </a:schemeClr>
+                </a:solidFill>
+              </a:rPr>
               <a:t>the</a:t>
             </a:r>
             <a:r>
-              <a:rPr lang="pt-BR" dirty="0"/>
+              <a:rPr lang="pt-BR" dirty="0">
+                <a:solidFill>
+                  <a:schemeClr val="bg2">
+                    <a:lumMod val="25000"/>
+                  </a:schemeClr>
+                </a:solidFill>
+              </a:rPr>
               <a:t> </a:t>
             </a:r>
             <a:r>
-              <a:rPr lang="pt-BR" dirty="0" err="1"/>
+              <a:rPr lang="pt-BR" dirty="0" err="1">
+                <a:solidFill>
+                  <a:schemeClr val="bg2">
+                    <a:lumMod val="25000"/>
+                  </a:schemeClr>
+                </a:solidFill>
+              </a:rPr>
               <a:t>best</a:t>
             </a:r>
             <a:r>
-              <a:rPr lang="pt-BR" dirty="0"/>
+              <a:rPr lang="pt-BR" dirty="0">
+                <a:solidFill>
+                  <a:schemeClr val="bg2">
+                    <a:lumMod val="25000"/>
+                  </a:schemeClr>
+                </a:solidFill>
+              </a:rPr>
               <a:t> </a:t>
             </a:r>
             <a:r>
-              <a:rPr lang="pt-BR" dirty="0" err="1"/>
+              <a:rPr lang="pt-BR" dirty="0" err="1">
+                <a:solidFill>
+                  <a:schemeClr val="bg2">
+                    <a:lumMod val="25000"/>
+                  </a:schemeClr>
+                </a:solidFill>
+              </a:rPr>
               <a:t>sequence</a:t>
             </a:r>
             <a:r>
-              <a:rPr lang="pt-BR" dirty="0"/>
+              <a:rPr lang="pt-BR" dirty="0">
+                <a:solidFill>
+                  <a:schemeClr val="bg2">
+                    <a:lumMod val="25000"/>
+                  </a:schemeClr>
+                </a:solidFill>
+              </a:rPr>
               <a:t> </a:t>
             </a:r>
             <a:r>
-              <a:rPr lang="pt-BR" dirty="0" err="1"/>
+              <a:rPr lang="pt-BR" dirty="0" err="1">
+                <a:solidFill>
+                  <a:schemeClr val="bg2">
+                    <a:lumMod val="25000"/>
+                  </a:schemeClr>
+                </a:solidFill>
+              </a:rPr>
               <a:t>of</a:t>
             </a:r>
             <a:r>
-              <a:rPr lang="pt-BR" dirty="0"/>
+              <a:rPr lang="pt-BR" dirty="0">
+                <a:solidFill>
+                  <a:schemeClr val="bg2">
+                    <a:lumMod val="25000"/>
+                  </a:schemeClr>
+                </a:solidFill>
+              </a:rPr>
               <a:t> </a:t>
             </a:r>
             <a:r>
-              <a:rPr lang="pt-BR" dirty="0" err="1"/>
+              <a:rPr lang="pt-BR" dirty="0" err="1">
+                <a:solidFill>
+                  <a:schemeClr val="bg2">
+                    <a:lumMod val="25000"/>
+                  </a:schemeClr>
+                </a:solidFill>
+              </a:rPr>
               <a:t>the</a:t>
             </a:r>
             <a:r>
-              <a:rPr lang="pt-BR" dirty="0"/>
+              <a:rPr lang="pt-BR" dirty="0">
+                <a:solidFill>
+                  <a:schemeClr val="bg2">
+                    <a:lumMod val="25000"/>
+                  </a:schemeClr>
+                </a:solidFill>
+              </a:rPr>
               <a:t> </a:t>
             </a:r>
             <a:r>
-              <a:rPr lang="pt-BR" dirty="0" err="1"/>
+              <a:rPr lang="pt-BR" dirty="0" err="1">
+                <a:solidFill>
+                  <a:schemeClr val="bg2">
+                    <a:lumMod val="25000"/>
+                  </a:schemeClr>
+                </a:solidFill>
+              </a:rPr>
               <a:t>cards</a:t>
             </a:r>
             <a:r>
-              <a:rPr lang="pt-BR" dirty="0"/>
+              <a:rPr lang="pt-BR" dirty="0">
+                <a:solidFill>
+                  <a:schemeClr val="bg2">
+                    <a:lumMod val="25000"/>
+                  </a:schemeClr>
+                </a:solidFill>
+              </a:rPr>
               <a:t> for </a:t>
             </a:r>
             <a:r>
-              <a:rPr lang="pt-BR" dirty="0" err="1"/>
+              <a:rPr lang="pt-BR" dirty="0" err="1">
+                <a:solidFill>
+                  <a:schemeClr val="bg2">
+                    <a:lumMod val="25000"/>
+                  </a:schemeClr>
+                </a:solidFill>
+              </a:rPr>
               <a:t>each</a:t>
             </a:r>
             <a:r>
-              <a:rPr lang="pt-BR" dirty="0"/>
+              <a:rPr lang="pt-BR" dirty="0">
+                <a:solidFill>
+                  <a:schemeClr val="bg2">
+                    <a:lumMod val="25000"/>
+                  </a:schemeClr>
+                </a:solidFill>
+              </a:rPr>
               <a:t> round</a:t>
             </a:r>
           </a:p>
           <a:p>
             <a:r>
-              <a:rPr lang="pt-BR" dirty="0" err="1"/>
+              <a:rPr lang="pt-BR" dirty="0" err="1">
+                <a:solidFill>
+                  <a:schemeClr val="bg2">
+                    <a:lumMod val="25000"/>
+                  </a:schemeClr>
+                </a:solidFill>
+              </a:rPr>
               <a:t>Class</a:t>
             </a:r>
             <a:r>
-              <a:rPr lang="pt-BR" dirty="0"/>
+              <a:rPr lang="pt-BR" dirty="0">
+                <a:solidFill>
+                  <a:schemeClr val="bg2">
+                    <a:lumMod val="25000"/>
+                  </a:schemeClr>
+                </a:solidFill>
+              </a:rPr>
               <a:t> </a:t>
             </a:r>
             <a:r>
-              <a:rPr lang="pt-BR" dirty="0" err="1"/>
+              <a:rPr lang="pt-BR" dirty="0" err="1">
+                <a:solidFill>
+                  <a:schemeClr val="bg2">
+                    <a:lumMod val="25000"/>
+                  </a:schemeClr>
+                </a:solidFill>
+              </a:rPr>
               <a:t>definitions</a:t>
             </a:r>
             <a:r>
-              <a:rPr lang="pt-BR" dirty="0"/>
+              <a:rPr lang="pt-BR" dirty="0">
+                <a:solidFill>
+                  <a:schemeClr val="bg2">
+                    <a:lumMod val="25000"/>
+                  </a:schemeClr>
+                </a:solidFill>
+              </a:rPr>
               <a:t> </a:t>
             </a:r>
             <a:r>
-              <a:rPr lang="pt-BR" dirty="0" err="1"/>
+              <a:rPr lang="pt-BR" dirty="0" err="1">
+                <a:solidFill>
+                  <a:schemeClr val="bg2">
+                    <a:lumMod val="25000"/>
+                  </a:schemeClr>
+                </a:solidFill>
+              </a:rPr>
               <a:t>and</a:t>
             </a:r>
             <a:r>
-              <a:rPr lang="pt-BR" dirty="0"/>
+              <a:rPr lang="pt-BR" dirty="0">
+                <a:solidFill>
+                  <a:schemeClr val="bg2">
+                    <a:lumMod val="25000"/>
+                  </a:schemeClr>
+                </a:solidFill>
+              </a:rPr>
               <a:t> </a:t>
             </a:r>
             <a:r>
-              <a:rPr lang="pt-BR" dirty="0" err="1"/>
+              <a:rPr lang="pt-BR" dirty="0" err="1">
+                <a:solidFill>
+                  <a:schemeClr val="bg2">
+                    <a:lumMod val="25000"/>
+                  </a:schemeClr>
+                </a:solidFill>
+              </a:rPr>
               <a:t>how</a:t>
             </a:r>
             <a:r>
-              <a:rPr lang="pt-BR" dirty="0"/>
+              <a:rPr lang="pt-BR" dirty="0">
+                <a:solidFill>
+                  <a:schemeClr val="bg2">
+                    <a:lumMod val="25000"/>
+                  </a:schemeClr>
+                </a:solidFill>
+              </a:rPr>
               <a:t> </a:t>
             </a:r>
             <a:r>
-              <a:rPr lang="pt-BR" dirty="0" err="1"/>
+              <a:rPr lang="pt-BR" dirty="0" err="1">
+                <a:solidFill>
+                  <a:schemeClr val="bg2">
+                    <a:lumMod val="25000"/>
+                  </a:schemeClr>
+                </a:solidFill>
+              </a:rPr>
               <a:t>structure</a:t>
             </a:r>
             <a:r>
-              <a:rPr lang="pt-BR" dirty="0"/>
+              <a:rPr lang="pt-BR" dirty="0">
+                <a:solidFill>
+                  <a:schemeClr val="bg2">
+                    <a:lumMod val="25000"/>
+                  </a:schemeClr>
+                </a:solidFill>
+              </a:rPr>
               <a:t> </a:t>
             </a:r>
             <a:r>
-              <a:rPr lang="pt-BR" dirty="0" err="1"/>
+              <a:rPr lang="pt-BR" dirty="0" err="1">
+                <a:solidFill>
+                  <a:schemeClr val="bg2">
+                    <a:lumMod val="25000"/>
+                  </a:schemeClr>
+                </a:solidFill>
+              </a:rPr>
               <a:t>the</a:t>
             </a:r>
             <a:r>
-              <a:rPr lang="pt-BR" dirty="0"/>
+              <a:rPr lang="pt-BR" dirty="0">
+                <a:solidFill>
+                  <a:schemeClr val="bg2">
+                    <a:lumMod val="25000"/>
+                  </a:schemeClr>
+                </a:solidFill>
+              </a:rPr>
               <a:t> game </a:t>
             </a:r>
             <a:r>
-              <a:rPr lang="pt-BR" dirty="0" err="1"/>
+              <a:rPr lang="pt-BR" dirty="0" err="1">
+                <a:solidFill>
+                  <a:schemeClr val="bg2">
+                    <a:lumMod val="25000"/>
+                  </a:schemeClr>
+                </a:solidFill>
+              </a:rPr>
               <a:t>code</a:t>
             </a:r>
             <a:r>
-              <a:rPr lang="pt-BR" dirty="0"/>
+              <a:rPr lang="pt-BR" dirty="0">
+                <a:solidFill>
+                  <a:schemeClr val="bg2">
+                    <a:lumMod val="25000"/>
+                  </a:schemeClr>
+                </a:solidFill>
+              </a:rPr>
               <a:t> </a:t>
             </a:r>
             <a:r>
-              <a:rPr lang="pt-BR" dirty="0" err="1"/>
+              <a:rPr lang="pt-BR" dirty="0" err="1">
+                <a:solidFill>
+                  <a:schemeClr val="bg2">
+                    <a:lumMod val="25000"/>
+                  </a:schemeClr>
+                </a:solidFill>
+              </a:rPr>
               <a:t>based</a:t>
             </a:r>
             <a:r>
-              <a:rPr lang="pt-BR" dirty="0"/>
+              <a:rPr lang="pt-BR" dirty="0">
+                <a:solidFill>
+                  <a:schemeClr val="bg2">
+                    <a:lumMod val="25000"/>
+                  </a:schemeClr>
+                </a:solidFill>
+              </a:rPr>
               <a:t> on OOP</a:t>
             </a:r>
           </a:p>
           <a:p>
             <a:r>
-              <a:rPr lang="pt-BR" dirty="0"/>
+              <a:rPr lang="pt-BR" dirty="0">
+                <a:solidFill>
+                  <a:schemeClr val="bg2">
+                    <a:lumMod val="25000"/>
+                  </a:schemeClr>
+                </a:solidFill>
+              </a:rPr>
               <a:t>Time</a:t>
             </a:r>
           </a:p>
           <a:p>
             <a:r>
-              <a:rPr lang="pt-BR" dirty="0"/>
+              <a:rPr lang="pt-BR" dirty="0">
+                <a:solidFill>
+                  <a:schemeClr val="bg2">
+                    <a:lumMod val="25000"/>
+                  </a:schemeClr>
+                </a:solidFill>
+              </a:rPr>
               <a:t>Truco </a:t>
             </a:r>
             <a:r>
-              <a:rPr lang="pt-BR" dirty="0" err="1"/>
+              <a:rPr lang="pt-BR" dirty="0" err="1">
+                <a:solidFill>
+                  <a:schemeClr val="bg2">
+                    <a:lumMod val="25000"/>
+                  </a:schemeClr>
+                </a:solidFill>
+              </a:rPr>
               <a:t>feature</a:t>
             </a:r>
-            <a:endParaRPr lang="pt-BR" dirty="0"/>
-          </a:p>
-        </p:txBody>
-      </p:sp>
+            <a:endParaRPr lang="pt-BR" dirty="0">
+              <a:solidFill>
+                <a:schemeClr val="bg2">
+                  <a:lumMod val="25000"/>
+                </a:schemeClr>
+              </a:solidFill>
+            </a:endParaRPr>
+          </a:p>
+        </p:txBody>
+      </p:sp>
+      <p:pic>
+        <p:nvPicPr>
+          <p:cNvPr id="4" name="Imagem 3">
+            <a:extLst>
+              <a:ext uri="{FF2B5EF4-FFF2-40B4-BE49-F238E27FC236}">
+                <a16:creationId xmlns:a16="http://schemas.microsoft.com/office/drawing/2014/main" id="{D208CABB-9611-44DF-BCBA-AA84A4EF8269}"/>
+              </a:ext>
+            </a:extLst>
+          </p:cNvPr>
+          <p:cNvPicPr>
+            <a:picLocks noChangeAspect="1"/>
+          </p:cNvPicPr>
+          <p:nvPr/>
+        </p:nvPicPr>
+        <p:blipFill>
+          <a:blip r:embed="rId2">
+            <a:extLst>
+              <a:ext uri="{BEBA8EAE-BF5A-486C-A8C5-ECC9F3942E4B}">
+                <a14:imgProps xmlns:a14="http://schemas.microsoft.com/office/drawing/2010/main">
+                  <a14:imgLayer r:embed="rId3">
+                    <a14:imgEffect>
+                      <a14:artisticCrisscrossEtching/>
+                    </a14:imgEffect>
+                  </a14:imgLayer>
+                </a14:imgProps>
+              </a:ext>
+              <a:ext uri="{28A0092B-C50C-407E-A947-70E740481C1C}">
+                <a14:useLocalDpi xmlns:a14="http://schemas.microsoft.com/office/drawing/2010/main" val="0"/>
+              </a:ext>
+            </a:extLst>
+          </a:blip>
+          <a:stretch>
+            <a:fillRect/>
+          </a:stretch>
+        </p:blipFill>
+        <p:spPr>
+          <a:xfrm>
+            <a:off x="10575065" y="142612"/>
+            <a:ext cx="1401355" cy="1401355"/>
+          </a:xfrm>
+          <a:prstGeom prst="rect">
+            <a:avLst/>
+          </a:prstGeom>
+          <a:effectLst>
+            <a:outerShdw blurRad="838200" dist="50800" dir="5400000" algn="ctr" rotWithShape="0">
+              <a:schemeClr val="accent6">
+                <a:lumMod val="20000"/>
+                <a:lumOff val="80000"/>
+                <a:alpha val="0"/>
+              </a:schemeClr>
+            </a:outerShdw>
+          </a:effectLst>
+        </p:spPr>
+      </p:pic>
     </p:spTree>
     <p:extLst>
       <p:ext uri="{BB962C8B-B14F-4D97-AF65-F5344CB8AC3E}">
@@ -4282,7 +4956,7 @@
           <p:cNvPr id="2" name="Título 1">
             <a:extLst>
               <a:ext uri="{FF2B5EF4-FFF2-40B4-BE49-F238E27FC236}">
-                <a16:creationId xmlns:a16="http://schemas.microsoft.com/office/drawing/2014/main" id="{555C1691-4134-4B78-AEA8-6C2CD655AFAE}"/>
+                <a16:creationId xmlns:a16="http://schemas.microsoft.com/office/drawing/2014/main" id="{6B0B115C-3C79-4B9E-AD0F-8B6BA185062D}"/>
               </a:ext>
             </a:extLst>
           </p:cNvPr>
@@ -4299,18 +4973,35 @@
           <a:lstStyle/>
           <a:p>
             <a:r>
-              <a:rPr lang="pt-BR" dirty="0" err="1"/>
-              <a:t>How</a:t>
-            </a:r>
-            <a:r>
-              <a:rPr lang="pt-BR" dirty="0"/>
-              <a:t> it </a:t>
-            </a:r>
-            <a:r>
-              <a:rPr lang="pt-BR" dirty="0" err="1"/>
-              <a:t>works</a:t>
-            </a:r>
-            <a:endParaRPr lang="pt-BR" dirty="0"/>
+              <a:rPr lang="pt-BR" dirty="0">
+                <a:solidFill>
+                  <a:schemeClr val="bg2">
+                    <a:lumMod val="25000"/>
+                  </a:schemeClr>
+                </a:solidFill>
+              </a:rPr>
+              <a:t>Big </a:t>
+            </a:r>
+            <a:r>
+              <a:rPr lang="pt-BR" dirty="0" err="1">
+                <a:solidFill>
+                  <a:schemeClr val="bg2">
+                    <a:lumMod val="25000"/>
+                  </a:schemeClr>
+                </a:solidFill>
+              </a:rPr>
+              <a:t>Mistakes</a:t>
+            </a:r>
+            <a:r>
+              <a:rPr lang="pt-BR" dirty="0">
+                <a:solidFill>
+                  <a:schemeClr val="bg2">
+                    <a:lumMod val="25000"/>
+                  </a:schemeClr>
+                </a:solidFill>
+              </a:rPr>
+              <a:t>	</a:t>
+            </a:r>
           </a:p>
         </p:txBody>
       </p:sp>
@@ -4319,7 +5010,7 @@
           <p:cNvPr id="3" name="Espaço Reservado para Conteúdo 2">
             <a:extLst>
               <a:ext uri="{FF2B5EF4-FFF2-40B4-BE49-F238E27FC236}">
-                <a16:creationId xmlns:a16="http://schemas.microsoft.com/office/drawing/2014/main" id="{106D474D-222B-443D-B776-51E676BFD583}"/>
+                <a16:creationId xmlns:a16="http://schemas.microsoft.com/office/drawing/2014/main" id="{30D71FD3-80F4-47B7-9641-598672C24801}"/>
               </a:ext>
             </a:extLst>
           </p:cNvPr>
@@ -4330,213 +5021,337 @@
             <p:ph idx="1"/>
           </p:nvPr>
         </p:nvSpPr>
-        <p:spPr/>
+        <p:spPr>
+          <a:solidFill>
+            <a:schemeClr val="bg1"/>
+          </a:solidFill>
+          <a:ln>
+            <a:gradFill flip="none" rotWithShape="1">
+              <a:gsLst>
+                <a:gs pos="0">
+                  <a:schemeClr val="accent6">
+                    <a:lumMod val="0"/>
+                    <a:lumOff val="100000"/>
+                  </a:schemeClr>
+                </a:gs>
+                <a:gs pos="35000">
+                  <a:schemeClr val="accent6">
+                    <a:lumMod val="0"/>
+                    <a:lumOff val="100000"/>
+                  </a:schemeClr>
+                </a:gs>
+                <a:gs pos="100000">
+                  <a:schemeClr val="accent6">
+                    <a:lumMod val="100000"/>
+                  </a:schemeClr>
+                </a:gs>
+              </a:gsLst>
+              <a:path path="circle">
+                <a:fillToRect l="50000" t="-80000" r="50000" b="180000"/>
+              </a:path>
+              <a:tileRect/>
+            </a:gradFill>
+          </a:ln>
+        </p:spPr>
         <p:txBody>
           <a:bodyPr/>
           <a:lstStyle/>
           <a:p>
             <a:r>
-              <a:rPr lang="pt-BR" dirty="0"/>
-              <a:t>Start </a:t>
-            </a:r>
-            <a:r>
-              <a:rPr lang="pt-BR" dirty="0" err="1"/>
+              <a:rPr lang="pt-BR" dirty="0" err="1">
+                <a:solidFill>
+                  <a:schemeClr val="bg2">
+                    <a:lumMod val="25000"/>
+                  </a:schemeClr>
+                </a:solidFill>
+              </a:rPr>
+              <a:t>Typos</a:t>
+            </a:r>
+            <a:endParaRPr lang="pt-BR" dirty="0">
+              <a:solidFill>
+                <a:schemeClr val="bg2">
+                  <a:lumMod val="25000"/>
+                </a:schemeClr>
+              </a:solidFill>
+            </a:endParaRPr>
+          </a:p>
+          <a:p>
+            <a:r>
+              <a:rPr lang="pt-BR" dirty="0" err="1">
+                <a:solidFill>
+                  <a:schemeClr val="bg2">
+                    <a:lumMod val="25000"/>
+                  </a:schemeClr>
+                </a:solidFill>
+              </a:rPr>
+              <a:t>Variable</a:t>
+            </a:r>
+            <a:r>
+              <a:rPr lang="pt-BR" dirty="0">
+                <a:solidFill>
+                  <a:schemeClr val="bg2">
+                    <a:lumMod val="25000"/>
+                  </a:schemeClr>
+                </a:solidFill>
+              </a:rPr>
+              <a:t> </a:t>
+            </a:r>
+            <a:r>
+              <a:rPr lang="pt-BR" dirty="0" err="1">
+                <a:solidFill>
+                  <a:schemeClr val="bg2">
+                    <a:lumMod val="25000"/>
+                  </a:schemeClr>
+                </a:solidFill>
+              </a:rPr>
+              <a:t>names</a:t>
+            </a:r>
+            <a:endParaRPr lang="pt-BR" dirty="0">
+              <a:solidFill>
+                <a:schemeClr val="bg2">
+                  <a:lumMod val="25000"/>
+                </a:schemeClr>
+              </a:solidFill>
+            </a:endParaRPr>
+          </a:p>
+          <a:p>
+            <a:r>
+              <a:rPr lang="pt-BR" dirty="0" err="1">
+                <a:solidFill>
+                  <a:schemeClr val="bg2">
+                    <a:lumMod val="25000"/>
+                  </a:schemeClr>
+                </a:solidFill>
+              </a:rPr>
+              <a:t>Using</a:t>
+            </a:r>
+            <a:r>
+              <a:rPr lang="pt-BR" dirty="0">
+                <a:solidFill>
+                  <a:schemeClr val="bg2">
+                    <a:lumMod val="25000"/>
+                  </a:schemeClr>
+                </a:solidFill>
+              </a:rPr>
+              <a:t> </a:t>
+            </a:r>
+            <a:r>
+              <a:rPr lang="pt-BR" dirty="0" err="1">
+                <a:solidFill>
+                  <a:schemeClr val="bg2">
+                    <a:lumMod val="25000"/>
+                  </a:schemeClr>
+                </a:solidFill>
+              </a:rPr>
               <a:t>the</a:t>
             </a:r>
             <a:r>
-              <a:rPr lang="pt-BR" dirty="0"/>
-              <a:t> Game</a:t>
-            </a:r>
-          </a:p>
-          <a:p>
-            <a:r>
-              <a:rPr lang="pt-BR" dirty="0" err="1"/>
-              <a:t>Shuffle</a:t>
-            </a:r>
-            <a:r>
-              <a:rPr lang="pt-BR" dirty="0"/>
+              <a:rPr lang="pt-BR" dirty="0">
+                <a:solidFill>
+                  <a:schemeClr val="bg2">
+                    <a:lumMod val="25000"/>
+                  </a:schemeClr>
+                </a:solidFill>
+              </a:rPr>
               <a:t> </a:t>
             </a:r>
             <a:r>
-              <a:rPr lang="pt-BR" dirty="0" err="1"/>
-              <a:t>and</a:t>
-            </a:r>
-            <a:r>
-              <a:rPr lang="pt-BR" dirty="0"/>
+              <a:rPr lang="pt-BR" dirty="0" err="1">
+                <a:solidFill>
+                  <a:schemeClr val="bg2">
+                    <a:lumMod val="25000"/>
+                  </a:schemeClr>
+                </a:solidFill>
+              </a:rPr>
+              <a:t>wrong</a:t>
+            </a:r>
+            <a:r>
+              <a:rPr lang="pt-BR" dirty="0">
+                <a:solidFill>
+                  <a:schemeClr val="bg2">
+                    <a:lumMod val="25000"/>
+                  </a:schemeClr>
+                </a:solidFill>
+              </a:rPr>
               <a:t> </a:t>
             </a:r>
             <a:r>
-              <a:rPr lang="pt-BR" dirty="0" err="1"/>
-              <a:t>Distribute</a:t>
-            </a:r>
-            <a:r>
-              <a:rPr lang="pt-BR" dirty="0"/>
+              <a:rPr lang="pt-BR" dirty="0" err="1">
+                <a:solidFill>
+                  <a:schemeClr val="bg2">
+                    <a:lumMod val="25000"/>
+                  </a:schemeClr>
+                </a:solidFill>
+              </a:rPr>
+              <a:t>class</a:t>
+            </a:r>
+            <a:r>
+              <a:rPr lang="pt-BR" dirty="0">
+                <a:solidFill>
+                  <a:schemeClr val="bg2">
+                    <a:lumMod val="25000"/>
+                  </a:schemeClr>
+                </a:solidFill>
+              </a:rPr>
+              <a:t> for </a:t>
+            </a:r>
+            <a:r>
+              <a:rPr lang="pt-BR" dirty="0" err="1">
+                <a:solidFill>
+                  <a:schemeClr val="bg2">
+                    <a:lumMod val="25000"/>
+                  </a:schemeClr>
+                </a:solidFill>
+              </a:rPr>
+              <a:t>specific</a:t>
+            </a:r>
+            <a:r>
+              <a:rPr lang="pt-BR" dirty="0">
+                <a:solidFill>
+                  <a:schemeClr val="bg2">
+                    <a:lumMod val="25000"/>
+                  </a:schemeClr>
+                </a:solidFill>
+              </a:rPr>
               <a:t> </a:t>
             </a:r>
             <a:r>
-              <a:rPr lang="pt-BR" dirty="0" err="1"/>
-              <a:t>cards</a:t>
-            </a:r>
-            <a:endParaRPr lang="pt-BR" dirty="0"/>
-          </a:p>
-          <a:p>
-            <a:r>
-              <a:rPr lang="pt-BR" dirty="0"/>
-              <a:t>Define </a:t>
-            </a:r>
-            <a:r>
-              <a:rPr lang="pt-BR" dirty="0" err="1"/>
-              <a:t>the</a:t>
-            </a:r>
-            <a:r>
-              <a:rPr lang="pt-BR" dirty="0"/>
+              <a:rPr lang="pt-BR" dirty="0" err="1">
+                <a:solidFill>
+                  <a:schemeClr val="bg2">
+                    <a:lumMod val="25000"/>
+                  </a:schemeClr>
+                </a:solidFill>
+              </a:rPr>
+              <a:t>functions</a:t>
+            </a:r>
+            <a:endParaRPr lang="pt-BR" dirty="0">
+              <a:solidFill>
+                <a:schemeClr val="bg2">
+                  <a:lumMod val="25000"/>
+                </a:schemeClr>
+              </a:solidFill>
+            </a:endParaRPr>
+          </a:p>
+          <a:p>
+            <a:r>
+              <a:rPr lang="pt-BR" dirty="0" err="1">
+                <a:solidFill>
+                  <a:schemeClr val="bg2">
+                    <a:lumMod val="25000"/>
+                  </a:schemeClr>
+                </a:solidFill>
+              </a:rPr>
+              <a:t>Functions</a:t>
+            </a:r>
+            <a:r>
+              <a:rPr lang="pt-BR" dirty="0">
+                <a:solidFill>
+                  <a:schemeClr val="bg2">
+                    <a:lumMod val="25000"/>
+                  </a:schemeClr>
+                </a:solidFill>
+              </a:rPr>
+              <a:t> with too </a:t>
+            </a:r>
+            <a:r>
+              <a:rPr lang="pt-BR" dirty="0" err="1">
+                <a:solidFill>
+                  <a:schemeClr val="bg2">
+                    <a:lumMod val="25000"/>
+                  </a:schemeClr>
+                </a:solidFill>
+              </a:rPr>
+              <a:t>many</a:t>
+            </a:r>
+            <a:r>
+              <a:rPr lang="pt-BR" dirty="0">
+                <a:solidFill>
+                  <a:schemeClr val="bg2">
+                    <a:lumMod val="25000"/>
+                  </a:schemeClr>
+                </a:solidFill>
+              </a:rPr>
               <a:t> </a:t>
             </a:r>
             <a:r>
-              <a:rPr lang="pt-BR" dirty="0" err="1"/>
-              <a:t>best</a:t>
-            </a:r>
-            <a:r>
-              <a:rPr lang="pt-BR" dirty="0"/>
-              <a:t> </a:t>
-            </a:r>
-            <a:r>
-              <a:rPr lang="pt-BR" dirty="0" err="1"/>
-              <a:t>card</a:t>
-            </a:r>
-            <a:r>
-              <a:rPr lang="pt-BR" dirty="0"/>
-              <a:t> </a:t>
-            </a:r>
-            <a:r>
-              <a:rPr lang="pt-BR" dirty="0" err="1"/>
-              <a:t>sequence</a:t>
-            </a:r>
-            <a:endParaRPr lang="pt-BR" dirty="0"/>
-          </a:p>
-          <a:p>
-            <a:r>
-              <a:rPr lang="pt-BR" dirty="0"/>
-              <a:t>Players </a:t>
-            </a:r>
-            <a:r>
-              <a:rPr lang="pt-BR" dirty="0" err="1"/>
-              <a:t>select</a:t>
-            </a:r>
-            <a:r>
-              <a:rPr lang="pt-BR" dirty="0"/>
-              <a:t> </a:t>
-            </a:r>
-            <a:r>
-              <a:rPr lang="pt-BR" dirty="0" err="1"/>
-              <a:t>the</a:t>
-            </a:r>
-            <a:r>
-              <a:rPr lang="pt-BR" dirty="0"/>
-              <a:t> </a:t>
-            </a:r>
-            <a:r>
-              <a:rPr lang="pt-BR" dirty="0" err="1"/>
-              <a:t>card</a:t>
-            </a:r>
-            <a:endParaRPr lang="pt-BR" dirty="0"/>
-          </a:p>
-          <a:p>
-            <a:r>
-              <a:rPr lang="pt-BR" dirty="0"/>
-              <a:t>Compare </a:t>
-            </a:r>
-            <a:r>
-              <a:rPr lang="pt-BR" dirty="0" err="1"/>
-              <a:t>cards</a:t>
-            </a:r>
-            <a:endParaRPr lang="pt-BR" dirty="0"/>
-          </a:p>
-          <a:p>
-            <a:r>
-              <a:rPr lang="pt-BR" dirty="0"/>
-              <a:t>Define </a:t>
-            </a:r>
-            <a:r>
-              <a:rPr lang="pt-BR" dirty="0" err="1"/>
-              <a:t>the</a:t>
-            </a:r>
-            <a:r>
-              <a:rPr lang="pt-BR" dirty="0"/>
-              <a:t> </a:t>
-            </a:r>
-            <a:r>
-              <a:rPr lang="pt-BR" dirty="0" err="1"/>
-              <a:t>winner</a:t>
-            </a:r>
-            <a:r>
-              <a:rPr lang="pt-BR" dirty="0"/>
-              <a:t> </a:t>
-            </a:r>
-            <a:r>
-              <a:rPr lang="pt-BR" dirty="0" err="1"/>
-              <a:t>of</a:t>
-            </a:r>
-            <a:r>
-              <a:rPr lang="pt-BR" dirty="0"/>
-              <a:t> </a:t>
-            </a:r>
-            <a:r>
-              <a:rPr lang="pt-BR" dirty="0" err="1"/>
-              <a:t>the</a:t>
-            </a:r>
-            <a:r>
-              <a:rPr lang="pt-BR" dirty="0"/>
-              <a:t> Round</a:t>
-            </a:r>
-          </a:p>
-          <a:p>
-            <a:r>
-              <a:rPr lang="pt-BR" dirty="0"/>
-              <a:t>Define </a:t>
-            </a:r>
-            <a:r>
-              <a:rPr lang="pt-BR" dirty="0" err="1"/>
-              <a:t>the</a:t>
-            </a:r>
-            <a:r>
-              <a:rPr lang="pt-BR" dirty="0"/>
-              <a:t> </a:t>
-            </a:r>
-            <a:r>
-              <a:rPr lang="pt-BR" dirty="0" err="1"/>
-              <a:t>winner</a:t>
-            </a:r>
-            <a:r>
-              <a:rPr lang="pt-BR" dirty="0"/>
-              <a:t> </a:t>
-            </a:r>
-            <a:r>
-              <a:rPr lang="pt-BR" dirty="0" err="1"/>
-              <a:t>of</a:t>
-            </a:r>
-            <a:r>
-              <a:rPr lang="pt-BR" dirty="0"/>
-              <a:t> </a:t>
-            </a:r>
-            <a:r>
-              <a:rPr lang="pt-BR" dirty="0" err="1"/>
-              <a:t>the</a:t>
-            </a:r>
-            <a:r>
-              <a:rPr lang="pt-BR" dirty="0"/>
-              <a:t> game</a:t>
-            </a:r>
-          </a:p>
-          <a:p>
-            <a:endParaRPr lang="pt-BR" dirty="0"/>
-          </a:p>
-        </p:txBody>
-      </p:sp>
+              <a:rPr lang="pt-BR" dirty="0" err="1">
+                <a:solidFill>
+                  <a:schemeClr val="bg2">
+                    <a:lumMod val="25000"/>
+                  </a:schemeClr>
+                </a:solidFill>
+              </a:rPr>
+              <a:t>functions</a:t>
+            </a:r>
+            <a:endParaRPr lang="pt-BR" dirty="0">
+              <a:solidFill>
+                <a:schemeClr val="bg2">
+                  <a:lumMod val="25000"/>
+                </a:schemeClr>
+              </a:solidFill>
+            </a:endParaRPr>
+          </a:p>
+        </p:txBody>
+      </p:sp>
+      <p:pic>
+        <p:nvPicPr>
+          <p:cNvPr id="4" name="Imagem 3">
+            <a:extLst>
+              <a:ext uri="{FF2B5EF4-FFF2-40B4-BE49-F238E27FC236}">
+                <a16:creationId xmlns:a16="http://schemas.microsoft.com/office/drawing/2014/main" id="{4C3F5DD2-B61A-4F8F-B78E-678ABAAEF7E4}"/>
+              </a:ext>
+            </a:extLst>
+          </p:cNvPr>
+          <p:cNvPicPr>
+            <a:picLocks noChangeAspect="1"/>
+          </p:cNvPicPr>
+          <p:nvPr/>
+        </p:nvPicPr>
+        <p:blipFill>
+          <a:blip r:embed="rId2">
+            <a:extLst>
+              <a:ext uri="{BEBA8EAE-BF5A-486C-A8C5-ECC9F3942E4B}">
+                <a14:imgProps xmlns:a14="http://schemas.microsoft.com/office/drawing/2010/main">
+                  <a14:imgLayer r:embed="rId3">
+                    <a14:imgEffect>
+                      <a14:artisticCrisscrossEtching/>
+                    </a14:imgEffect>
+                  </a14:imgLayer>
+                </a14:imgProps>
+              </a:ext>
+              <a:ext uri="{28A0092B-C50C-407E-A947-70E740481C1C}">
+                <a14:useLocalDpi xmlns:a14="http://schemas.microsoft.com/office/drawing/2010/main" val="0"/>
+              </a:ext>
+            </a:extLst>
+          </a:blip>
+          <a:stretch>
+            <a:fillRect/>
+          </a:stretch>
+        </p:blipFill>
+        <p:spPr>
+          <a:xfrm>
+            <a:off x="10575065" y="142612"/>
+            <a:ext cx="1401355" cy="1401355"/>
+          </a:xfrm>
+          <a:prstGeom prst="rect">
+            <a:avLst/>
+          </a:prstGeom>
+          <a:effectLst>
+            <a:outerShdw blurRad="838200" dist="50800" dir="5400000" algn="ctr" rotWithShape="0">
+              <a:schemeClr val="accent6">
+                <a:lumMod val="20000"/>
+                <a:lumOff val="80000"/>
+                <a:alpha val="0"/>
+              </a:schemeClr>
+            </a:outerShdw>
+          </a:effectLst>
+        </p:spPr>
+      </p:pic>
     </p:spTree>
     <p:extLst>
       <p:ext uri="{BB962C8B-B14F-4D97-AF65-F5344CB8AC3E}">
-        <p14:creationId xmlns:p14="http://schemas.microsoft.com/office/powerpoint/2010/main" val="1236669318"/>
+        <p14:creationId xmlns:p14="http://schemas.microsoft.com/office/powerpoint/2010/main" val="311113391"/>
       </p:ext>
     </p:extLst>
   </p:cSld>
@@ -4568,7 +5383,7 @@
           <p:cNvPr id="2" name="Título 1">
             <a:extLst>
               <a:ext uri="{FF2B5EF4-FFF2-40B4-BE49-F238E27FC236}">
-                <a16:creationId xmlns:a16="http://schemas.microsoft.com/office/drawing/2014/main" id="{58D6DB49-DE40-4A7C-BBA1-BB0A3AB2E84C}"/>
+                <a16:creationId xmlns:a16="http://schemas.microsoft.com/office/drawing/2014/main" id="{555C1691-4134-4B78-AEA8-6C2CD655AFAE}"/>
               </a:ext>
             </a:extLst>
           </p:cNvPr>
@@ -4579,15 +5394,53 @@
             <p:ph type="title"/>
           </p:nvPr>
         </p:nvSpPr>
-        <p:spPr/>
+        <p:spPr>
+          <a:xfrm>
+            <a:off x="838200" y="393117"/>
+            <a:ext cx="10515600" cy="1325563"/>
+          </a:xfrm>
+        </p:spPr>
         <p:txBody>
           <a:bodyPr/>
           <a:lstStyle/>
           <a:p>
             <a:r>
-              <a:rPr lang="pt-BR" dirty="0"/>
-              <a:t>Thank you!</a:t>
-            </a:r>
+              <a:rPr lang="pt-BR" dirty="0" err="1">
+                <a:solidFill>
+                  <a:schemeClr val="bg2">
+                    <a:lumMod val="25000"/>
+                  </a:schemeClr>
+                </a:solidFill>
+              </a:rPr>
+              <a:t>How</a:t>
+            </a:r>
+            <a:r>
+              <a:rPr lang="pt-BR" dirty="0">
+                <a:solidFill>
+                  <a:schemeClr val="bg2">
+                    <a:lumMod val="25000"/>
+                  </a:schemeClr>
+                </a:solidFill>
+              </a:rPr>
+              <a:t> it </a:t>
+            </a:r>
+            <a:r>
+              <a:rPr lang="pt-BR" dirty="0" err="1">
+                <a:solidFill>
+                  <a:schemeClr val="bg2">
+                    <a:lumMod val="25000"/>
+                  </a:schemeClr>
+                </a:solidFill>
+              </a:rPr>
+              <a:t>works</a:t>
+            </a:r>
+            <a:endParaRPr lang="pt-BR" dirty="0">
+              <a:solidFill>
+                <a:schemeClr val="bg2">
+                  <a:lumMod val="25000"/>
+                </a:schemeClr>
+              </a:solidFill>
+            </a:endParaRPr>
           </a:p>
         </p:txBody>
       </p:sp>
@@ -4596,7 +5449,7 @@
           <p:cNvPr id="3" name="Espaço Reservado para Conteúdo 2">
             <a:extLst>
               <a:ext uri="{FF2B5EF4-FFF2-40B4-BE49-F238E27FC236}">
-                <a16:creationId xmlns:a16="http://schemas.microsoft.com/office/drawing/2014/main" id="{DC50D25C-F098-4616-ACF1-D45864FEC13E}"/>
+                <a16:creationId xmlns:a16="http://schemas.microsoft.com/office/drawing/2014/main" id="{106D474D-222B-443D-B776-51E676BFD583}"/>
               </a:ext>
             </a:extLst>
           </p:cNvPr>
@@ -4607,276 +5460,1316 @@
             <p:ph idx="1"/>
           </p:nvPr>
         </p:nvSpPr>
-        <p:spPr/>
+        <p:spPr>
+          <a:ln>
+            <a:gradFill flip="none" rotWithShape="1">
+              <a:gsLst>
+                <a:gs pos="0">
+                  <a:schemeClr val="accent6">
+                    <a:lumMod val="0"/>
+                    <a:lumOff val="100000"/>
+                  </a:schemeClr>
+                </a:gs>
+                <a:gs pos="35000">
+                  <a:schemeClr val="accent6">
+                    <a:lumMod val="0"/>
+                    <a:lumOff val="100000"/>
+                  </a:schemeClr>
+                </a:gs>
+                <a:gs pos="100000">
+                  <a:schemeClr val="accent6">
+                    <a:lumMod val="100000"/>
+                  </a:schemeClr>
+                </a:gs>
+              </a:gsLst>
+              <a:path path="circle">
+                <a:fillToRect l="50000" t="-80000" r="50000" b="180000"/>
+              </a:path>
+              <a:tileRect/>
+            </a:gradFill>
+          </a:ln>
+        </p:spPr>
         <p:txBody>
           <a:bodyPr/>
           <a:lstStyle/>
           <a:p>
             <a:r>
-              <a:rPr lang="pt-BR" dirty="0"/>
+              <a:rPr lang="pt-BR" dirty="0">
+                <a:solidFill>
+                  <a:schemeClr val="bg2">
+                    <a:lumMod val="25000"/>
+                  </a:schemeClr>
+                </a:solidFill>
+              </a:rPr>
+              <a:t>Start </a:t>
+            </a:r>
+            <a:r>
+              <a:rPr lang="pt-BR" dirty="0" err="1">
+                <a:solidFill>
+                  <a:schemeClr val="bg2">
+                    <a:lumMod val="25000"/>
+                  </a:schemeClr>
+                </a:solidFill>
+              </a:rPr>
+              <a:t>the</a:t>
+            </a:r>
+            <a:r>
+              <a:rPr lang="pt-BR" dirty="0">
+                <a:solidFill>
+                  <a:schemeClr val="bg2">
+                    <a:lumMod val="25000"/>
+                  </a:schemeClr>
+                </a:solidFill>
+              </a:rPr>
+              <a:t> Game</a:t>
+            </a:r>
+          </a:p>
+          <a:p>
+            <a:r>
+              <a:rPr lang="pt-BR" dirty="0" err="1">
+                <a:solidFill>
+                  <a:schemeClr val="bg2">
+                    <a:lumMod val="25000"/>
+                  </a:schemeClr>
+                </a:solidFill>
+              </a:rPr>
+              <a:t>Shuffle</a:t>
+            </a:r>
+            <a:r>
+              <a:rPr lang="pt-BR" dirty="0">
+                <a:solidFill>
+                  <a:schemeClr val="bg2">
+                    <a:lumMod val="25000"/>
+                  </a:schemeClr>
+                </a:solidFill>
+              </a:rPr>
+              <a:t> </a:t>
+            </a:r>
+            <a:r>
+              <a:rPr lang="pt-BR" dirty="0" err="1">
+                <a:solidFill>
+                  <a:schemeClr val="bg2">
+                    <a:lumMod val="25000"/>
+                  </a:schemeClr>
+                </a:solidFill>
+              </a:rPr>
+              <a:t>and</a:t>
+            </a:r>
+            <a:r>
+              <a:rPr lang="pt-BR" dirty="0">
+                <a:solidFill>
+                  <a:schemeClr val="bg2">
+                    <a:lumMod val="25000"/>
+                  </a:schemeClr>
+                </a:solidFill>
+              </a:rPr>
+              <a:t> </a:t>
+            </a:r>
+            <a:r>
+              <a:rPr lang="pt-BR" dirty="0" err="1">
+                <a:solidFill>
+                  <a:schemeClr val="bg2">
+                    <a:lumMod val="25000"/>
+                  </a:schemeClr>
+                </a:solidFill>
+              </a:rPr>
+              <a:t>Distribute</a:t>
+            </a:r>
+            <a:r>
+              <a:rPr lang="pt-BR" dirty="0">
+                <a:solidFill>
+                  <a:schemeClr val="bg2">
+                    <a:lumMod val="25000"/>
+                  </a:schemeClr>
+                </a:solidFill>
+              </a:rPr>
+              <a:t> </a:t>
+            </a:r>
+            <a:r>
+              <a:rPr lang="pt-BR" dirty="0" err="1">
+                <a:solidFill>
+                  <a:schemeClr val="bg2">
+                    <a:lumMod val="25000"/>
+                  </a:schemeClr>
+                </a:solidFill>
+              </a:rPr>
+              <a:t>cards</a:t>
+            </a:r>
+            <a:endParaRPr lang="pt-BR" dirty="0">
+              <a:solidFill>
+                <a:schemeClr val="bg2">
+                  <a:lumMod val="25000"/>
+                </a:schemeClr>
+              </a:solidFill>
+            </a:endParaRPr>
+          </a:p>
+          <a:p>
+            <a:r>
+              <a:rPr lang="pt-BR" dirty="0">
+                <a:solidFill>
+                  <a:schemeClr val="bg2">
+                    <a:lumMod val="25000"/>
+                  </a:schemeClr>
+                </a:solidFill>
+              </a:rPr>
+              <a:t>Define </a:t>
+            </a:r>
+            <a:r>
+              <a:rPr lang="pt-BR" dirty="0" err="1">
+                <a:solidFill>
+                  <a:schemeClr val="bg2">
+                    <a:lumMod val="25000"/>
+                  </a:schemeClr>
+                </a:solidFill>
+              </a:rPr>
+              <a:t>the</a:t>
+            </a:r>
+            <a:r>
+              <a:rPr lang="pt-BR" dirty="0">
+                <a:solidFill>
+                  <a:schemeClr val="bg2">
+                    <a:lumMod val="25000"/>
+                  </a:schemeClr>
+                </a:solidFill>
+              </a:rPr>
+              <a:t> </a:t>
+            </a:r>
+            <a:r>
+              <a:rPr lang="pt-BR" dirty="0" err="1">
+                <a:solidFill>
+                  <a:schemeClr val="bg2">
+                    <a:lumMod val="25000"/>
+                  </a:schemeClr>
+                </a:solidFill>
+              </a:rPr>
+              <a:t>best</a:t>
+            </a:r>
+            <a:r>
+              <a:rPr lang="pt-BR" dirty="0">
+                <a:solidFill>
+                  <a:schemeClr val="bg2">
+                    <a:lumMod val="25000"/>
+                  </a:schemeClr>
+                </a:solidFill>
+              </a:rPr>
+              <a:t> </a:t>
+            </a:r>
+            <a:r>
+              <a:rPr lang="pt-BR" dirty="0" err="1">
+                <a:solidFill>
+                  <a:schemeClr val="bg2">
+                    <a:lumMod val="25000"/>
+                  </a:schemeClr>
+                </a:solidFill>
+              </a:rPr>
+              <a:t>card</a:t>
+            </a:r>
+            <a:r>
+              <a:rPr lang="pt-BR" dirty="0">
+                <a:solidFill>
+                  <a:schemeClr val="bg2">
+                    <a:lumMod val="25000"/>
+                  </a:schemeClr>
+                </a:solidFill>
+              </a:rPr>
+              <a:t> </a:t>
+            </a:r>
+            <a:r>
+              <a:rPr lang="pt-BR" dirty="0" err="1">
+                <a:solidFill>
+                  <a:schemeClr val="bg2">
+                    <a:lumMod val="25000"/>
+                  </a:schemeClr>
+                </a:solidFill>
+              </a:rPr>
+              <a:t>sequence</a:t>
+            </a:r>
+            <a:endParaRPr lang="pt-BR" dirty="0">
+              <a:solidFill>
+                <a:schemeClr val="bg2">
+                  <a:lumMod val="25000"/>
+                </a:schemeClr>
+              </a:solidFill>
+            </a:endParaRPr>
+          </a:p>
+          <a:p>
+            <a:r>
+              <a:rPr lang="pt-BR" dirty="0">
+                <a:solidFill>
+                  <a:schemeClr val="bg2">
+                    <a:lumMod val="25000"/>
+                  </a:schemeClr>
+                </a:solidFill>
+              </a:rPr>
+              <a:t>Players </a:t>
+            </a:r>
+            <a:r>
+              <a:rPr lang="pt-BR" dirty="0" err="1">
+                <a:solidFill>
+                  <a:schemeClr val="bg2">
+                    <a:lumMod val="25000"/>
+                  </a:schemeClr>
+                </a:solidFill>
+              </a:rPr>
+              <a:t>select</a:t>
+            </a:r>
+            <a:r>
+              <a:rPr lang="pt-BR" dirty="0">
+                <a:solidFill>
+                  <a:schemeClr val="bg2">
+                    <a:lumMod val="25000"/>
+                  </a:schemeClr>
+                </a:solidFill>
+              </a:rPr>
+              <a:t> </a:t>
+            </a:r>
+            <a:r>
+              <a:rPr lang="pt-BR" dirty="0" err="1">
+                <a:solidFill>
+                  <a:schemeClr val="bg2">
+                    <a:lumMod val="25000"/>
+                  </a:schemeClr>
+                </a:solidFill>
+              </a:rPr>
+              <a:t>the</a:t>
+            </a:r>
+            <a:r>
+              <a:rPr lang="pt-BR" dirty="0">
+                <a:solidFill>
+                  <a:schemeClr val="bg2">
+                    <a:lumMod val="25000"/>
+                  </a:schemeClr>
+                </a:solidFill>
+              </a:rPr>
+              <a:t> </a:t>
+            </a:r>
+            <a:r>
+              <a:rPr lang="pt-BR" dirty="0" err="1">
+                <a:solidFill>
+                  <a:schemeClr val="bg2">
+                    <a:lumMod val="25000"/>
+                  </a:schemeClr>
+                </a:solidFill>
+              </a:rPr>
+              <a:t>card</a:t>
+            </a:r>
+            <a:endParaRPr lang="pt-BR" dirty="0">
+              <a:solidFill>
+                <a:schemeClr val="bg2">
+                  <a:lumMod val="25000"/>
+                </a:schemeClr>
+              </a:solidFill>
+            </a:endParaRPr>
+          </a:p>
+          <a:p>
+            <a:r>
+              <a:rPr lang="pt-BR" dirty="0">
+                <a:solidFill>
+                  <a:schemeClr val="bg2">
+                    <a:lumMod val="25000"/>
+                  </a:schemeClr>
+                </a:solidFill>
+              </a:rPr>
+              <a:t>Compare </a:t>
+            </a:r>
+            <a:r>
+              <a:rPr lang="pt-BR" dirty="0" err="1">
+                <a:solidFill>
+                  <a:schemeClr val="bg2">
+                    <a:lumMod val="25000"/>
+                  </a:schemeClr>
+                </a:solidFill>
+              </a:rPr>
+              <a:t>cards</a:t>
+            </a:r>
+            <a:endParaRPr lang="pt-BR" dirty="0">
+              <a:solidFill>
+                <a:schemeClr val="bg2">
+                  <a:lumMod val="25000"/>
+                </a:schemeClr>
+              </a:solidFill>
+            </a:endParaRPr>
+          </a:p>
+          <a:p>
+            <a:r>
+              <a:rPr lang="pt-BR" dirty="0">
+                <a:solidFill>
+                  <a:schemeClr val="bg2">
+                    <a:lumMod val="25000"/>
+                  </a:schemeClr>
+                </a:solidFill>
+              </a:rPr>
+              <a:t>Define </a:t>
+            </a:r>
+            <a:r>
+              <a:rPr lang="pt-BR" dirty="0" err="1">
+                <a:solidFill>
+                  <a:schemeClr val="bg2">
+                    <a:lumMod val="25000"/>
+                  </a:schemeClr>
+                </a:solidFill>
+              </a:rPr>
+              <a:t>the</a:t>
+            </a:r>
+            <a:r>
+              <a:rPr lang="pt-BR" dirty="0">
+                <a:solidFill>
+                  <a:schemeClr val="bg2">
+                    <a:lumMod val="25000"/>
+                  </a:schemeClr>
+                </a:solidFill>
+              </a:rPr>
+              <a:t> </a:t>
+            </a:r>
+            <a:r>
+              <a:rPr lang="pt-BR" dirty="0" err="1">
+                <a:solidFill>
+                  <a:schemeClr val="bg2">
+                    <a:lumMod val="25000"/>
+                  </a:schemeClr>
+                </a:solidFill>
+              </a:rPr>
+              <a:t>winner</a:t>
+            </a:r>
+            <a:r>
+              <a:rPr lang="pt-BR" dirty="0">
+                <a:solidFill>
+                  <a:schemeClr val="bg2">
+                    <a:lumMod val="25000"/>
+                  </a:schemeClr>
+                </a:solidFill>
+              </a:rPr>
+              <a:t> </a:t>
+            </a:r>
+            <a:r>
+              <a:rPr lang="pt-BR" dirty="0" err="1">
+                <a:solidFill>
+                  <a:schemeClr val="bg2">
+                    <a:lumMod val="25000"/>
+                  </a:schemeClr>
+                </a:solidFill>
+              </a:rPr>
+              <a:t>of</a:t>
+            </a:r>
+            <a:r>
+              <a:rPr lang="pt-BR" dirty="0">
+                <a:solidFill>
+                  <a:schemeClr val="bg2">
+                    <a:lumMod val="25000"/>
+                  </a:schemeClr>
+                </a:solidFill>
+              </a:rPr>
+              <a:t> </a:t>
+            </a:r>
+            <a:r>
+              <a:rPr lang="pt-BR" dirty="0" err="1">
+                <a:solidFill>
+                  <a:schemeClr val="bg2">
+                    <a:lumMod val="25000"/>
+                  </a:schemeClr>
+                </a:solidFill>
+              </a:rPr>
+              <a:t>the</a:t>
+            </a:r>
+            <a:r>
+              <a:rPr lang="pt-BR" dirty="0">
+                <a:solidFill>
+                  <a:schemeClr val="bg2">
+                    <a:lumMod val="25000"/>
+                  </a:schemeClr>
+                </a:solidFill>
+              </a:rPr>
+              <a:t> Round</a:t>
+            </a:r>
+          </a:p>
+          <a:p>
+            <a:r>
+              <a:rPr lang="pt-BR" dirty="0">
+                <a:solidFill>
+                  <a:schemeClr val="bg2">
+                    <a:lumMod val="25000"/>
+                  </a:schemeClr>
+                </a:solidFill>
+              </a:rPr>
+              <a:t>Define </a:t>
+            </a:r>
+            <a:r>
+              <a:rPr lang="pt-BR" dirty="0" err="1">
+                <a:solidFill>
+                  <a:schemeClr val="bg2">
+                    <a:lumMod val="25000"/>
+                  </a:schemeClr>
+                </a:solidFill>
+              </a:rPr>
+              <a:t>the</a:t>
+            </a:r>
+            <a:r>
+              <a:rPr lang="pt-BR" dirty="0">
+                <a:solidFill>
+                  <a:schemeClr val="bg2">
+                    <a:lumMod val="25000"/>
+                  </a:schemeClr>
+                </a:solidFill>
+              </a:rPr>
+              <a:t> </a:t>
+            </a:r>
+            <a:r>
+              <a:rPr lang="pt-BR" dirty="0" err="1">
+                <a:solidFill>
+                  <a:schemeClr val="bg2">
+                    <a:lumMod val="25000"/>
+                  </a:schemeClr>
+                </a:solidFill>
+              </a:rPr>
+              <a:t>winner</a:t>
+            </a:r>
+            <a:r>
+              <a:rPr lang="pt-BR" dirty="0">
+                <a:solidFill>
+                  <a:schemeClr val="bg2">
+                    <a:lumMod val="25000"/>
+                  </a:schemeClr>
+                </a:solidFill>
+              </a:rPr>
+              <a:t> </a:t>
+            </a:r>
+            <a:r>
+              <a:rPr lang="pt-BR" dirty="0" err="1">
+                <a:solidFill>
+                  <a:schemeClr val="bg2">
+                    <a:lumMod val="25000"/>
+                  </a:schemeClr>
+                </a:solidFill>
+              </a:rPr>
+              <a:t>of</a:t>
+            </a:r>
+            <a:r>
+              <a:rPr lang="pt-BR" dirty="0">
+                <a:solidFill>
+                  <a:schemeClr val="bg2">
+                    <a:lumMod val="25000"/>
+                  </a:schemeClr>
+                </a:solidFill>
+              </a:rPr>
+              <a:t> </a:t>
+            </a:r>
+            <a:r>
+              <a:rPr lang="pt-BR" dirty="0" err="1">
+                <a:solidFill>
+                  <a:schemeClr val="bg2">
+                    <a:lumMod val="25000"/>
+                  </a:schemeClr>
+                </a:solidFill>
+              </a:rPr>
+              <a:t>the</a:t>
+            </a:r>
+            <a:r>
+              <a:rPr lang="pt-BR" dirty="0">
+                <a:solidFill>
+                  <a:schemeClr val="bg2">
+                    <a:lumMod val="25000"/>
+                  </a:schemeClr>
+                </a:solidFill>
+              </a:rPr>
+              <a:t> game Score 12</a:t>
+            </a:r>
+          </a:p>
+          <a:p>
+            <a:endParaRPr lang="pt-BR" dirty="0"/>
+          </a:p>
+        </p:txBody>
+      </p:sp>
+      <p:pic>
+        <p:nvPicPr>
+          <p:cNvPr id="4" name="Imagem 3">
+            <a:extLst>
+              <a:ext uri="{FF2B5EF4-FFF2-40B4-BE49-F238E27FC236}">
+                <a16:creationId xmlns:a16="http://schemas.microsoft.com/office/drawing/2014/main" id="{C9DB3375-0690-4D00-A374-5EC230951738}"/>
+              </a:ext>
+            </a:extLst>
+          </p:cNvPr>
+          <p:cNvPicPr>
+            <a:picLocks noChangeAspect="1"/>
+          </p:cNvPicPr>
+          <p:nvPr/>
+        </p:nvPicPr>
+        <p:blipFill>
+          <a:blip r:embed="rId2">
+            <a:extLst>
+              <a:ext uri="{BEBA8EAE-BF5A-486C-A8C5-ECC9F3942E4B}">
+                <a14:imgProps xmlns:a14="http://schemas.microsoft.com/office/drawing/2010/main">
+                  <a14:imgLayer r:embed="rId3">
+                    <a14:imgEffect>
+                      <a14:artisticCrisscrossEtching/>
+                    </a14:imgEffect>
+                  </a14:imgLayer>
+                </a14:imgProps>
+              </a:ext>
+              <a:ext uri="{28A0092B-C50C-407E-A947-70E740481C1C}">
+                <a14:useLocalDpi xmlns:a14="http://schemas.microsoft.com/office/drawing/2010/main" val="0"/>
+              </a:ext>
+            </a:extLst>
+          </a:blip>
+          <a:stretch>
+            <a:fillRect/>
+          </a:stretch>
+        </p:blipFill>
+        <p:spPr>
+          <a:xfrm>
+            <a:off x="10575065" y="142612"/>
+            <a:ext cx="1401355" cy="1401355"/>
+          </a:xfrm>
+          <a:prstGeom prst="rect">
+            <a:avLst/>
+          </a:prstGeom>
+          <a:effectLst>
+            <a:outerShdw blurRad="838200" dist="50800" dir="5400000" algn="ctr" rotWithShape="0">
+              <a:schemeClr val="accent6">
+                <a:lumMod val="20000"/>
+                <a:lumOff val="80000"/>
+                <a:alpha val="0"/>
+              </a:schemeClr>
+            </a:outerShdw>
+          </a:effectLst>
+        </p:spPr>
+      </p:pic>
+    </p:spTree>
+    <p:extLst>
+      <p:ext uri="{BB962C8B-B14F-4D97-AF65-F5344CB8AC3E}">
+        <p14:creationId xmlns:p14="http://schemas.microsoft.com/office/powerpoint/2010/main" val="1236669318"/>
+      </p:ext>
+    </p:extLst>
+  </p:cSld>
+  <p:clrMapOvr>
+    <a:masterClrMapping/>
+  </p:clrMapOvr>
+</p:sld>
+</file>
+
+<file path=ppt/slides/slide7.xml><?xml version="1.0" encoding="utf-8"?>
+<p:sld xmlns:a="http://schemas.openxmlformats.org/drawingml/2006/main" xmlns:r="http://schemas.openxmlformats.org/officeDocument/2006/relationships" xmlns:p="http://schemas.openxmlformats.org/presentationml/2006/main">
+  <p:cSld>
+    <p:spTree>
+      <p:nvGrpSpPr>
+        <p:cNvPr id="1" name=""/>
+        <p:cNvGrpSpPr/>
+        <p:nvPr/>
+      </p:nvGrpSpPr>
+      <p:grpSpPr>
+        <a:xfrm>
+          <a:off x="0" y="0"/>
+          <a:ext cx="0" cy="0"/>
+          <a:chOff x="0" y="0"/>
+          <a:chExt cx="0" cy="0"/>
+        </a:xfrm>
+      </p:grpSpPr>
+      <p:sp>
+        <p:nvSpPr>
+          <p:cNvPr id="2" name="Título 1">
+            <a:extLst>
+              <a:ext uri="{FF2B5EF4-FFF2-40B4-BE49-F238E27FC236}">
+                <a16:creationId xmlns:a16="http://schemas.microsoft.com/office/drawing/2014/main" id="{3D73511A-5CC5-46EB-A947-6FF9EB9E3AC5}"/>
+              </a:ext>
+            </a:extLst>
+          </p:cNvPr>
+          <p:cNvSpPr>
+            <a:spLocks noGrp="1"/>
+          </p:cNvSpPr>
+          <p:nvPr>
+            <p:ph type="title"/>
+          </p:nvPr>
+        </p:nvSpPr>
+        <p:spPr/>
+        <p:txBody>
+          <a:bodyPr/>
+          <a:lstStyle/>
+          <a:p>
+            <a:pPr algn="ctr"/>
+            <a:r>
+              <a:rPr lang="pt-BR" dirty="0">
+                <a:solidFill>
+                  <a:schemeClr val="bg2">
+                    <a:lumMod val="25000"/>
+                  </a:schemeClr>
+                </a:solidFill>
+              </a:rPr>
+              <a:t>Game board</a:t>
+            </a:r>
+          </a:p>
+        </p:txBody>
+      </p:sp>
+      <p:pic>
+        <p:nvPicPr>
+          <p:cNvPr id="7" name="Imagem 6">
+            <a:extLst>
+              <a:ext uri="{FF2B5EF4-FFF2-40B4-BE49-F238E27FC236}">
+                <a16:creationId xmlns:a16="http://schemas.microsoft.com/office/drawing/2014/main" id="{E9CF4A89-CF80-4F8B-BE71-119C43249E68}"/>
+              </a:ext>
+            </a:extLst>
+          </p:cNvPr>
+          <p:cNvPicPr>
+            <a:picLocks noChangeAspect="1"/>
+          </p:cNvPicPr>
+          <p:nvPr/>
+        </p:nvPicPr>
+        <p:blipFill>
+          <a:blip r:embed="rId2"/>
+          <a:stretch>
+            <a:fillRect/>
+          </a:stretch>
+        </p:blipFill>
+        <p:spPr>
+          <a:xfrm>
+            <a:off x="1413782" y="1690688"/>
+            <a:ext cx="8768618" cy="4322709"/>
+          </a:xfrm>
+          <a:prstGeom prst="rect">
+            <a:avLst/>
+          </a:prstGeom>
+        </p:spPr>
+      </p:pic>
+      <p:pic>
+        <p:nvPicPr>
+          <p:cNvPr id="4" name="Imagem 3">
+            <a:extLst>
+              <a:ext uri="{FF2B5EF4-FFF2-40B4-BE49-F238E27FC236}">
+                <a16:creationId xmlns:a16="http://schemas.microsoft.com/office/drawing/2014/main" id="{FF884069-5FF9-45EC-B667-5CD9C5154D2E}"/>
+              </a:ext>
+            </a:extLst>
+          </p:cNvPr>
+          <p:cNvPicPr>
+            <a:picLocks noChangeAspect="1"/>
+          </p:cNvPicPr>
+          <p:nvPr/>
+        </p:nvPicPr>
+        <p:blipFill>
+          <a:blip r:embed="rId3">
+            <a:extLst>
+              <a:ext uri="{BEBA8EAE-BF5A-486C-A8C5-ECC9F3942E4B}">
+                <a14:imgProps xmlns:a14="http://schemas.microsoft.com/office/drawing/2010/main">
+                  <a14:imgLayer r:embed="rId4">
+                    <a14:imgEffect>
+                      <a14:artisticCrisscrossEtching/>
+                    </a14:imgEffect>
+                  </a14:imgLayer>
+                </a14:imgProps>
+              </a:ext>
+              <a:ext uri="{28A0092B-C50C-407E-A947-70E740481C1C}">
+                <a14:useLocalDpi xmlns:a14="http://schemas.microsoft.com/office/drawing/2010/main" val="0"/>
+              </a:ext>
+            </a:extLst>
+          </a:blip>
+          <a:stretch>
+            <a:fillRect/>
+          </a:stretch>
+        </p:blipFill>
+        <p:spPr>
+          <a:xfrm>
+            <a:off x="10575065" y="142612"/>
+            <a:ext cx="1401355" cy="1401355"/>
+          </a:xfrm>
+          <a:prstGeom prst="rect">
+            <a:avLst/>
+          </a:prstGeom>
+          <a:effectLst>
+            <a:outerShdw blurRad="838200" dist="50800" dir="5400000" algn="ctr" rotWithShape="0">
+              <a:schemeClr val="accent6">
+                <a:lumMod val="20000"/>
+                <a:lumOff val="80000"/>
+                <a:alpha val="0"/>
+              </a:schemeClr>
+            </a:outerShdw>
+          </a:effectLst>
+        </p:spPr>
+      </p:pic>
+    </p:spTree>
+    <p:extLst>
+      <p:ext uri="{BB962C8B-B14F-4D97-AF65-F5344CB8AC3E}">
+        <p14:creationId xmlns:p14="http://schemas.microsoft.com/office/powerpoint/2010/main" val="3667670992"/>
+      </p:ext>
+    </p:extLst>
+  </p:cSld>
+  <p:clrMapOvr>
+    <a:masterClrMapping/>
+  </p:clrMapOvr>
+</p:sld>
+</file>
+
+<file path=ppt/slides/slide8.xml><?xml version="1.0" encoding="utf-8"?>
+<p:sld xmlns:a="http://schemas.openxmlformats.org/drawingml/2006/main" xmlns:r="http://schemas.openxmlformats.org/officeDocument/2006/relationships" xmlns:p="http://schemas.openxmlformats.org/presentationml/2006/main">
+  <p:cSld>
+    <p:spTree>
+      <p:nvGrpSpPr>
+        <p:cNvPr id="1" name=""/>
+        <p:cNvGrpSpPr/>
+        <p:nvPr/>
+      </p:nvGrpSpPr>
+      <p:grpSpPr>
+        <a:xfrm>
+          <a:off x="0" y="0"/>
+          <a:ext cx="0" cy="0"/>
+          <a:chOff x="0" y="0"/>
+          <a:chExt cx="0" cy="0"/>
+        </a:xfrm>
+      </p:grpSpPr>
+      <p:sp>
+        <p:nvSpPr>
+          <p:cNvPr id="2" name="Título 1">
+            <a:extLst>
+              <a:ext uri="{FF2B5EF4-FFF2-40B4-BE49-F238E27FC236}">
+                <a16:creationId xmlns:a16="http://schemas.microsoft.com/office/drawing/2014/main" id="{58D6DB49-DE40-4A7C-BBA1-BB0A3AB2E84C}"/>
+              </a:ext>
+            </a:extLst>
+          </p:cNvPr>
+          <p:cNvSpPr>
+            <a:spLocks noGrp="1"/>
+          </p:cNvSpPr>
+          <p:nvPr>
+            <p:ph type="title"/>
+          </p:nvPr>
+        </p:nvSpPr>
+        <p:spPr/>
+        <p:txBody>
+          <a:bodyPr/>
+          <a:lstStyle/>
+          <a:p>
+            <a:r>
+              <a:rPr lang="pt-BR" dirty="0">
+                <a:solidFill>
+                  <a:schemeClr val="bg2">
+                    <a:lumMod val="25000"/>
+                  </a:schemeClr>
+                </a:solidFill>
+              </a:rPr>
+              <a:t>Thank you!</a:t>
+            </a:r>
+          </a:p>
+        </p:txBody>
+      </p:sp>
+      <p:sp>
+        <p:nvSpPr>
+          <p:cNvPr id="3" name="Espaço Reservado para Conteúdo 2">
+            <a:extLst>
+              <a:ext uri="{FF2B5EF4-FFF2-40B4-BE49-F238E27FC236}">
+                <a16:creationId xmlns:a16="http://schemas.microsoft.com/office/drawing/2014/main" id="{DC50D25C-F098-4616-ACF1-D45864FEC13E}"/>
+              </a:ext>
+            </a:extLst>
+          </p:cNvPr>
+          <p:cNvSpPr>
+            <a:spLocks noGrp="1"/>
+          </p:cNvSpPr>
+          <p:nvPr>
+            <p:ph idx="1"/>
+          </p:nvPr>
+        </p:nvSpPr>
+        <p:spPr/>
+        <p:txBody>
+          <a:bodyPr/>
+          <a:lstStyle/>
+          <a:p>
+            <a:r>
+              <a:rPr lang="pt-BR" dirty="0">
+                <a:solidFill>
+                  <a:schemeClr val="bg2">
+                    <a:lumMod val="25000"/>
+                  </a:schemeClr>
+                </a:solidFill>
+              </a:rPr>
               <a:t>I would like </a:t>
             </a:r>
             <a:r>
-              <a:rPr lang="pt-BR" dirty="0" err="1"/>
+              <a:rPr lang="pt-BR" dirty="0" err="1">
+                <a:solidFill>
+                  <a:schemeClr val="bg2">
+                    <a:lumMod val="25000"/>
+                  </a:schemeClr>
+                </a:solidFill>
+              </a:rPr>
               <a:t>to</a:t>
             </a:r>
             <a:r>
-              <a:rPr lang="pt-BR" dirty="0"/>
+              <a:rPr lang="pt-BR" dirty="0">
+                <a:solidFill>
+                  <a:schemeClr val="bg2">
+                    <a:lumMod val="25000"/>
+                  </a:schemeClr>
+                </a:solidFill>
+              </a:rPr>
               <a:t> give </a:t>
             </a:r>
             <a:r>
-              <a:rPr lang="pt-BR" dirty="0" err="1"/>
+              <a:rPr lang="pt-BR" dirty="0" err="1">
+                <a:solidFill>
+                  <a:schemeClr val="bg2">
+                    <a:lumMod val="25000"/>
+                  </a:schemeClr>
+                </a:solidFill>
+              </a:rPr>
               <a:t>my</a:t>
             </a:r>
             <a:r>
-              <a:rPr lang="pt-BR" dirty="0"/>
+              <a:rPr lang="pt-BR" dirty="0">
+                <a:solidFill>
+                  <a:schemeClr val="bg2">
+                    <a:lumMod val="25000"/>
+                  </a:schemeClr>
+                </a:solidFill>
+              </a:rPr>
               <a:t> </a:t>
             </a:r>
             <a:r>
-              <a:rPr lang="pt-BR" dirty="0" err="1"/>
+              <a:rPr lang="pt-BR" dirty="0" err="1">
+                <a:solidFill>
+                  <a:schemeClr val="bg2">
+                    <a:lumMod val="25000"/>
+                  </a:schemeClr>
+                </a:solidFill>
+              </a:rPr>
               <a:t>thank</a:t>
             </a:r>
             <a:r>
-              <a:rPr lang="pt-BR" dirty="0"/>
+              <a:rPr lang="pt-BR" dirty="0">
+                <a:solidFill>
+                  <a:schemeClr val="bg2">
+                    <a:lumMod val="25000"/>
+                  </a:schemeClr>
+                </a:solidFill>
+              </a:rPr>
               <a:t> you </a:t>
             </a:r>
             <a:r>
-              <a:rPr lang="pt-BR" dirty="0" err="1"/>
+              <a:rPr lang="pt-BR" dirty="0" err="1">
+                <a:solidFill>
+                  <a:schemeClr val="bg2">
+                    <a:lumMod val="25000"/>
+                  </a:schemeClr>
+                </a:solidFill>
+              </a:rPr>
               <a:t>to</a:t>
             </a:r>
             <a:r>
-              <a:rPr lang="pt-BR" dirty="0"/>
+              <a:rPr lang="pt-BR" dirty="0">
+                <a:solidFill>
+                  <a:schemeClr val="bg2">
+                    <a:lumMod val="25000"/>
+                  </a:schemeClr>
+                </a:solidFill>
+              </a:rPr>
               <a:t> </a:t>
             </a:r>
             <a:r>
-              <a:rPr lang="pt-BR" dirty="0" err="1"/>
+              <a:rPr lang="pt-BR" dirty="0" err="1">
+                <a:solidFill>
+                  <a:schemeClr val="bg2">
+                    <a:lumMod val="25000"/>
+                  </a:schemeClr>
+                </a:solidFill>
+              </a:rPr>
               <a:t>my</a:t>
             </a:r>
             <a:r>
-              <a:rPr lang="pt-BR" dirty="0"/>
+              <a:rPr lang="pt-BR" dirty="0">
+                <a:solidFill>
+                  <a:schemeClr val="bg2">
+                    <a:lumMod val="25000"/>
+                  </a:schemeClr>
+                </a:solidFill>
+              </a:rPr>
               <a:t> </a:t>
             </a:r>
             <a:r>
-              <a:rPr lang="pt-BR" dirty="0" err="1"/>
+              <a:rPr lang="pt-BR" dirty="0" err="1">
+                <a:solidFill>
+                  <a:schemeClr val="bg2">
+                    <a:lumMod val="25000"/>
+                  </a:schemeClr>
+                </a:solidFill>
+              </a:rPr>
               <a:t>TA’s</a:t>
             </a:r>
             <a:r>
-              <a:rPr lang="pt-BR" dirty="0"/>
+              <a:rPr lang="pt-BR" dirty="0">
+                <a:solidFill>
+                  <a:schemeClr val="bg2">
+                    <a:lumMod val="25000"/>
+                  </a:schemeClr>
+                </a:solidFill>
+              </a:rPr>
               <a:t> </a:t>
             </a:r>
             <a:r>
-              <a:rPr lang="pt-BR" dirty="0" err="1"/>
+              <a:rPr lang="pt-BR" dirty="0" err="1">
+                <a:solidFill>
+                  <a:schemeClr val="bg2">
+                    <a:lumMod val="25000"/>
+                  </a:schemeClr>
+                </a:solidFill>
+              </a:rPr>
               <a:t>and</a:t>
             </a:r>
             <a:r>
-              <a:rPr lang="pt-BR" dirty="0"/>
+              <a:rPr lang="pt-BR" dirty="0">
+                <a:solidFill>
+                  <a:schemeClr val="bg2">
+                    <a:lumMod val="25000"/>
+                  </a:schemeClr>
+                </a:solidFill>
+              </a:rPr>
               <a:t> </a:t>
             </a:r>
             <a:r>
-              <a:rPr lang="pt-BR" dirty="0" err="1"/>
+              <a:rPr lang="pt-BR" dirty="0" err="1">
+                <a:solidFill>
+                  <a:schemeClr val="bg2">
+                    <a:lumMod val="25000"/>
+                  </a:schemeClr>
+                </a:solidFill>
+              </a:rPr>
               <a:t>teacher</a:t>
             </a:r>
             <a:r>
-              <a:rPr lang="pt-BR" dirty="0"/>
+              <a:rPr lang="pt-BR" dirty="0">
+                <a:solidFill>
+                  <a:schemeClr val="bg2">
+                    <a:lumMod val="25000"/>
+                  </a:schemeClr>
+                </a:solidFill>
+              </a:rPr>
               <a:t>, as </a:t>
             </a:r>
             <a:r>
-              <a:rPr lang="pt-BR" dirty="0" err="1"/>
+              <a:rPr lang="pt-BR" dirty="0" err="1">
+                <a:solidFill>
+                  <a:schemeClr val="bg2">
+                    <a:lumMod val="25000"/>
+                  </a:schemeClr>
+                </a:solidFill>
+              </a:rPr>
               <a:t>without</a:t>
             </a:r>
             <a:r>
-              <a:rPr lang="pt-BR" dirty="0"/>
+              <a:rPr lang="pt-BR" dirty="0">
+                <a:solidFill>
+                  <a:schemeClr val="bg2">
+                    <a:lumMod val="25000"/>
+                  </a:schemeClr>
+                </a:solidFill>
+              </a:rPr>
               <a:t> </a:t>
             </a:r>
             <a:r>
-              <a:rPr lang="pt-BR" dirty="0" err="1"/>
+              <a:rPr lang="pt-BR" dirty="0" err="1">
+                <a:solidFill>
+                  <a:schemeClr val="bg2">
+                    <a:lumMod val="25000"/>
+                  </a:schemeClr>
+                </a:solidFill>
+              </a:rPr>
               <a:t>their</a:t>
             </a:r>
             <a:r>
-              <a:rPr lang="pt-BR" dirty="0"/>
+              <a:rPr lang="pt-BR" dirty="0">
+                <a:solidFill>
+                  <a:schemeClr val="bg2">
+                    <a:lumMod val="25000"/>
+                  </a:schemeClr>
+                </a:solidFill>
+              </a:rPr>
               <a:t> help I would not </a:t>
             </a:r>
             <a:r>
-              <a:rPr lang="pt-BR" dirty="0" err="1"/>
+              <a:rPr lang="pt-BR" dirty="0" err="1">
+                <a:solidFill>
+                  <a:schemeClr val="bg2">
+                    <a:lumMod val="25000"/>
+                  </a:schemeClr>
+                </a:solidFill>
+              </a:rPr>
               <a:t>be</a:t>
             </a:r>
             <a:r>
-              <a:rPr lang="pt-BR" dirty="0"/>
+              <a:rPr lang="pt-BR" dirty="0">
+                <a:solidFill>
+                  <a:schemeClr val="bg2">
+                    <a:lumMod val="25000"/>
+                  </a:schemeClr>
+                </a:solidFill>
+              </a:rPr>
               <a:t> </a:t>
             </a:r>
             <a:r>
-              <a:rPr lang="pt-BR" dirty="0" err="1"/>
+              <a:rPr lang="pt-BR" dirty="0" err="1">
+                <a:solidFill>
+                  <a:schemeClr val="bg2">
+                    <a:lumMod val="25000"/>
+                  </a:schemeClr>
+                </a:solidFill>
+              </a:rPr>
               <a:t>capable</a:t>
             </a:r>
             <a:r>
-              <a:rPr lang="pt-BR" dirty="0"/>
+              <a:rPr lang="pt-BR" dirty="0">
+                <a:solidFill>
+                  <a:schemeClr val="bg2">
+                    <a:lumMod val="25000"/>
+                  </a:schemeClr>
+                </a:solidFill>
+              </a:rPr>
               <a:t> </a:t>
             </a:r>
             <a:r>
-              <a:rPr lang="pt-BR" dirty="0" err="1"/>
+              <a:rPr lang="pt-BR" dirty="0" err="1">
+                <a:solidFill>
+                  <a:schemeClr val="bg2">
+                    <a:lumMod val="25000"/>
+                  </a:schemeClr>
+                </a:solidFill>
+              </a:rPr>
               <a:t>to</a:t>
             </a:r>
             <a:r>
-              <a:rPr lang="pt-BR" dirty="0"/>
+              <a:rPr lang="pt-BR" dirty="0">
+                <a:solidFill>
+                  <a:schemeClr val="bg2">
+                    <a:lumMod val="25000"/>
+                  </a:schemeClr>
+                </a:solidFill>
+              </a:rPr>
               <a:t> </a:t>
             </a:r>
             <a:r>
-              <a:rPr lang="pt-BR" dirty="0" err="1"/>
+              <a:rPr lang="pt-BR" dirty="0" err="1">
+                <a:solidFill>
+                  <a:schemeClr val="bg2">
+                    <a:lumMod val="25000"/>
+                  </a:schemeClr>
+                </a:solidFill>
+              </a:rPr>
               <a:t>achieve</a:t>
             </a:r>
             <a:r>
-              <a:rPr lang="pt-BR" dirty="0"/>
+              <a:rPr lang="pt-BR" dirty="0">
+                <a:solidFill>
+                  <a:schemeClr val="bg2">
+                    <a:lumMod val="25000"/>
+                  </a:schemeClr>
+                </a:solidFill>
+              </a:rPr>
               <a:t> </a:t>
             </a:r>
             <a:r>
-              <a:rPr lang="pt-BR" dirty="0" err="1"/>
+              <a:rPr lang="pt-BR" dirty="0" err="1">
+                <a:solidFill>
+                  <a:schemeClr val="bg2">
+                    <a:lumMod val="25000"/>
+                  </a:schemeClr>
+                </a:solidFill>
+              </a:rPr>
               <a:t>the</a:t>
             </a:r>
             <a:r>
-              <a:rPr lang="pt-BR" dirty="0"/>
+              <a:rPr lang="pt-BR" dirty="0">
+                <a:solidFill>
+                  <a:schemeClr val="bg2">
+                    <a:lumMod val="25000"/>
+                  </a:schemeClr>
+                </a:solidFill>
+              </a:rPr>
               <a:t> </a:t>
             </a:r>
             <a:r>
-              <a:rPr lang="pt-BR" dirty="0" err="1"/>
+              <a:rPr lang="pt-BR" dirty="0" err="1">
+                <a:solidFill>
+                  <a:schemeClr val="bg2">
+                    <a:lumMod val="25000"/>
+                  </a:schemeClr>
+                </a:solidFill>
+              </a:rPr>
               <a:t>results</a:t>
             </a:r>
             <a:r>
-              <a:rPr lang="pt-BR" dirty="0"/>
+              <a:rPr lang="pt-BR" dirty="0">
+                <a:solidFill>
+                  <a:schemeClr val="bg2">
+                    <a:lumMod val="25000"/>
+                  </a:schemeClr>
+                </a:solidFill>
+              </a:rPr>
               <a:t> I </a:t>
             </a:r>
             <a:r>
-              <a:rPr lang="pt-BR" dirty="0" err="1"/>
+              <a:rPr lang="pt-BR" dirty="0" err="1">
+                <a:solidFill>
+                  <a:schemeClr val="bg2">
+                    <a:lumMod val="25000"/>
+                  </a:schemeClr>
+                </a:solidFill>
+              </a:rPr>
               <a:t>got</a:t>
             </a:r>
-            <a:r>
-              <a:rPr lang="pt-BR" dirty="0"/>
-              <a:t> with </a:t>
-            </a:r>
-            <a:r>
-              <a:rPr lang="pt-BR" dirty="0" err="1"/>
+            <a:endParaRPr lang="pt-BR" dirty="0">
+              <a:solidFill>
+                <a:schemeClr val="bg2">
+                  <a:lumMod val="25000"/>
+                </a:schemeClr>
+              </a:solidFill>
+            </a:endParaRPr>
+          </a:p>
+          <a:p>
+            <a:r>
+              <a:rPr lang="pt-BR" dirty="0" err="1">
+                <a:solidFill>
+                  <a:schemeClr val="bg2">
+                    <a:lumMod val="25000"/>
+                  </a:schemeClr>
+                </a:solidFill>
+              </a:rPr>
+              <a:t>Thanks</a:t>
+            </a:r>
+            <a:r>
+              <a:rPr lang="pt-BR" dirty="0">
+                <a:solidFill>
+                  <a:schemeClr val="bg2">
+                    <a:lumMod val="25000"/>
+                  </a:schemeClr>
+                </a:solidFill>
+              </a:rPr>
+              <a:t> </a:t>
+            </a:r>
+            <a:r>
+              <a:rPr lang="pt-BR" u="sng" dirty="0" err="1">
+                <a:solidFill>
+                  <a:schemeClr val="bg2">
+                    <a:lumMod val="25000"/>
+                  </a:schemeClr>
+                </a:solidFill>
+              </a:rPr>
+              <a:t>also</a:t>
+            </a:r>
+            <a:r>
+              <a:rPr lang="pt-BR" dirty="0">
+                <a:solidFill>
+                  <a:schemeClr val="bg2">
+                    <a:lumMod val="25000"/>
+                  </a:schemeClr>
+                </a:solidFill>
+              </a:rPr>
+              <a:t> </a:t>
+            </a:r>
+            <a:r>
+              <a:rPr lang="pt-BR" dirty="0" err="1">
+                <a:solidFill>
+                  <a:schemeClr val="bg2">
+                    <a:lumMod val="25000"/>
+                  </a:schemeClr>
+                </a:solidFill>
+              </a:rPr>
+              <a:t>my</a:t>
+            </a:r>
+            <a:r>
+              <a:rPr lang="pt-BR" dirty="0">
+                <a:solidFill>
+                  <a:schemeClr val="bg2">
+                    <a:lumMod val="25000"/>
+                  </a:schemeClr>
+                </a:solidFill>
+              </a:rPr>
+              <a:t> Family for all </a:t>
+            </a:r>
+            <a:r>
+              <a:rPr lang="pt-BR" dirty="0" err="1">
+                <a:solidFill>
+                  <a:schemeClr val="bg2">
+                    <a:lumMod val="25000"/>
+                  </a:schemeClr>
+                </a:solidFill>
+              </a:rPr>
               <a:t>the</a:t>
             </a:r>
             <a:r>
-              <a:rPr lang="pt-BR" dirty="0"/>
-              <a:t> final version</a:t>
-            </a:r>
-          </a:p>
-          <a:p>
-            <a:r>
-              <a:rPr lang="pt-BR" dirty="0" err="1"/>
-              <a:t>Thanks</a:t>
-            </a:r>
-            <a:r>
-              <a:rPr lang="pt-BR" dirty="0"/>
+              <a:rPr lang="pt-BR" dirty="0">
+                <a:solidFill>
+                  <a:schemeClr val="bg2">
+                    <a:lumMod val="25000"/>
+                  </a:schemeClr>
+                </a:solidFill>
+              </a:rPr>
               <a:t> </a:t>
             </a:r>
             <a:r>
-              <a:rPr lang="pt-BR" dirty="0" err="1"/>
-              <a:t>god</a:t>
-            </a:r>
-            <a:r>
-              <a:rPr lang="pt-BR" dirty="0"/>
-              <a:t> </a:t>
-            </a:r>
-            <a:r>
-              <a:rPr lang="pt-BR" dirty="0" err="1"/>
-              <a:t>and</a:t>
-            </a:r>
-            <a:r>
-              <a:rPr lang="pt-BR" dirty="0"/>
-              <a:t> </a:t>
-            </a:r>
-            <a:r>
-              <a:rPr lang="pt-BR" dirty="0" err="1"/>
-              <a:t>also</a:t>
-            </a:r>
-            <a:r>
-              <a:rPr lang="pt-BR" dirty="0"/>
-              <a:t> </a:t>
-            </a:r>
-            <a:r>
-              <a:rPr lang="pt-BR" dirty="0" err="1"/>
-              <a:t>my</a:t>
-            </a:r>
-            <a:r>
-              <a:rPr lang="pt-BR" dirty="0"/>
-              <a:t> Family for </a:t>
-            </a:r>
-            <a:r>
-              <a:rPr lang="pt-BR" dirty="0" err="1"/>
-              <a:t>the</a:t>
-            </a:r>
-            <a:r>
-              <a:rPr lang="pt-BR" dirty="0"/>
-              <a:t> </a:t>
-            </a:r>
-            <a:r>
-              <a:rPr lang="pt-BR" dirty="0" err="1"/>
+              <a:rPr lang="pt-BR" dirty="0" err="1">
+                <a:solidFill>
+                  <a:schemeClr val="bg2">
+                    <a:lumMod val="25000"/>
+                  </a:schemeClr>
+                </a:solidFill>
+              </a:rPr>
               <a:t>patience</a:t>
             </a:r>
-            <a:r>
-              <a:rPr lang="pt-BR" dirty="0"/>
-              <a:t> </a:t>
-            </a:r>
-            <a:r>
-              <a:rPr lang="pt-BR" dirty="0" err="1"/>
-              <a:t>while</a:t>
-            </a:r>
-            <a:r>
-              <a:rPr lang="pt-BR" dirty="0"/>
-              <a:t> I </a:t>
-            </a:r>
-            <a:r>
-              <a:rPr lang="pt-BR" dirty="0" err="1"/>
-              <a:t>was</a:t>
-            </a:r>
-            <a:r>
-              <a:rPr lang="pt-BR" dirty="0"/>
-              <a:t> out </a:t>
-            </a:r>
-            <a:r>
-              <a:rPr lang="pt-BR" dirty="0" err="1"/>
-              <a:t>studying</a:t>
-            </a:r>
-            <a:r>
-              <a:rPr lang="pt-BR" dirty="0"/>
-              <a:t> </a:t>
-            </a:r>
-            <a:r>
-              <a:rPr lang="pt-BR" dirty="0" err="1"/>
-              <a:t>or</a:t>
-            </a:r>
-            <a:r>
-              <a:rPr lang="pt-BR" dirty="0"/>
-              <a:t> </a:t>
-            </a:r>
-            <a:r>
-              <a:rPr lang="pt-BR" dirty="0" err="1"/>
-              <a:t>coding</a:t>
-            </a:r>
-            <a:r>
-              <a:rPr lang="pt-BR" dirty="0"/>
-              <a:t> in </a:t>
-            </a:r>
-            <a:r>
-              <a:rPr lang="pt-BR" dirty="0" err="1"/>
-              <a:t>our</a:t>
-            </a:r>
-            <a:r>
-              <a:rPr lang="pt-BR" dirty="0"/>
-              <a:t> </a:t>
-            </a:r>
-            <a:r>
-              <a:rPr lang="pt-BR" dirty="0" err="1"/>
-              <a:t>free</a:t>
-            </a:r>
-            <a:r>
-              <a:rPr lang="pt-BR" dirty="0"/>
-              <a:t> time</a:t>
-            </a:r>
-          </a:p>
-        </p:txBody>
-      </p:sp>
+            <a:endParaRPr lang="pt-BR" dirty="0">
+              <a:solidFill>
+                <a:schemeClr val="bg2">
+                  <a:lumMod val="25000"/>
+                </a:schemeClr>
+              </a:solidFill>
+            </a:endParaRPr>
+          </a:p>
+        </p:txBody>
+      </p:sp>
+      <p:pic>
+        <p:nvPicPr>
+          <p:cNvPr id="4" name="Imagem 3">
+            <a:extLst>
+              <a:ext uri="{FF2B5EF4-FFF2-40B4-BE49-F238E27FC236}">
+                <a16:creationId xmlns:a16="http://schemas.microsoft.com/office/drawing/2014/main" id="{F01DC711-4C94-4AE7-94AE-16C21E8BB6DE}"/>
+              </a:ext>
+            </a:extLst>
+          </p:cNvPr>
+          <p:cNvPicPr>
+            <a:picLocks noChangeAspect="1"/>
+          </p:cNvPicPr>
+          <p:nvPr/>
+        </p:nvPicPr>
+        <p:blipFill>
+          <a:blip r:embed="rId2">
+            <a:extLst>
+              <a:ext uri="{BEBA8EAE-BF5A-486C-A8C5-ECC9F3942E4B}">
+                <a14:imgProps xmlns:a14="http://schemas.microsoft.com/office/drawing/2010/main">
+                  <a14:imgLayer r:embed="rId3">
+                    <a14:imgEffect>
+                      <a14:artisticCrisscrossEtching/>
+                    </a14:imgEffect>
+                  </a14:imgLayer>
+                </a14:imgProps>
+              </a:ext>
+              <a:ext uri="{28A0092B-C50C-407E-A947-70E740481C1C}">
+                <a14:useLocalDpi xmlns:a14="http://schemas.microsoft.com/office/drawing/2010/main" val="0"/>
+              </a:ext>
+            </a:extLst>
+          </a:blip>
+          <a:stretch>
+            <a:fillRect/>
+          </a:stretch>
+        </p:blipFill>
+        <p:spPr>
+          <a:xfrm>
+            <a:off x="10575065" y="142612"/>
+            <a:ext cx="1401355" cy="1401355"/>
+          </a:xfrm>
+          <a:prstGeom prst="rect">
+            <a:avLst/>
+          </a:prstGeom>
+          <a:effectLst>
+            <a:outerShdw blurRad="838200" dist="50800" dir="5400000" algn="ctr" rotWithShape="0">
+              <a:schemeClr val="accent6">
+                <a:lumMod val="20000"/>
+                <a:lumOff val="80000"/>
+                <a:alpha val="0"/>
+              </a:schemeClr>
+            </a:outerShdw>
+          </a:effectLst>
+        </p:spPr>
+      </p:pic>
     </p:spTree>
     <p:extLst>
       <p:ext uri="{BB962C8B-B14F-4D97-AF65-F5344CB8AC3E}">

</xml_diff>